<commit_message>
Unit 6 design updated
</commit_message>
<xml_diff>
--- a/en/ProgrammingLessons/IfElseStatementsPy.pptx
+++ b/en/ProgrammingLessons/IfElseStatementsPy.pptx
@@ -2,7 +2,7 @@
 <file path=ppt/presentation.xml><?xml version="1.0" encoding="utf-8"?>
 <p:presentation xmlns:a="http://schemas.openxmlformats.org/drawingml/2006/main" xmlns:r="http://schemas.openxmlformats.org/officeDocument/2006/relationships" xmlns:p="http://schemas.openxmlformats.org/presentationml/2006/main" showSpecialPlsOnTitleSld="0" saveSubsetFonts="1" autoCompressPictures="0">
   <p:sldMasterIdLst>
-    <p:sldMasterId id="2147483761" r:id="rId1"/>
+    <p:sldMasterId id="2147483773" r:id="rId1"/>
   </p:sldMasterIdLst>
   <p:notesMasterIdLst>
     <p:notesMasterId r:id="rId9"/>
@@ -217,7 +217,7 @@
           <a:p>
             <a:fld id="{58040048-1E4D-CD41-AC49-0750EB72586B}" type="datetimeFigureOut">
               <a:rPr lang="en-US" smtClean="0"/>
-              <a:t>11/23/2020</a:t>
+              <a:t>12/17/20</a:t>
             </a:fld>
             <a:endParaRPr lang="en-US"/>
           </a:p>
@@ -383,7 +383,7 @@
           <a:p>
             <a:fld id="{2B8484CF-5098-F24E-8881-583515D5C406}" type="datetimeFigureOut">
               <a:rPr lang="en-US" smtClean="0"/>
-              <a:t>11/23/2020</a:t>
+              <a:t>12/17/20</a:t>
             </a:fld>
             <a:endParaRPr lang="en-US"/>
           </a:p>
@@ -676,7 +676,7 @@
         </p:nvSpPr>
         <p:spPr>
           <a:xfrm>
-            <a:off x="182241" y="2203290"/>
+            <a:off x="182241" y="2579003"/>
             <a:ext cx="8787652" cy="2468585"/>
           </a:xfrm>
           <a:prstGeom prst="rect">
@@ -717,8 +717,8 @@
         </p:nvSpPr>
         <p:spPr>
           <a:xfrm>
-            <a:off x="242754" y="2300865"/>
-            <a:ext cx="5815852" cy="1504844"/>
+            <a:off x="242754" y="2676578"/>
+            <a:ext cx="8584534" cy="1504844"/>
           </a:xfrm>
           <a:effectLst/>
         </p:spPr>
@@ -736,6 +736,10 @@
             </a:lvl1pPr>
           </a:lstStyle>
           <a:p>
+            <a:r>
+              <a:rPr lang="en-US"/>
+              <a:t>Click to edit Master title style</a:t>
+            </a:r>
             <a:endParaRPr lang="en-US" dirty="0"/>
           </a:p>
         </p:txBody>
@@ -752,7 +756,7 @@
         </p:nvSpPr>
         <p:spPr>
           <a:xfrm>
-            <a:off x="316712" y="3800535"/>
+            <a:off x="316712" y="4176248"/>
             <a:ext cx="5741894" cy="590321"/>
           </a:xfrm>
         </p:spPr>
@@ -765,7 +769,7 @@
               <a:buNone/>
               <a:defRPr sz="1600" cap="all">
                 <a:solidFill>
-                  <a:schemeClr val="accent2"/>
+                  <a:srgbClr val="0EAE9F"/>
                 </a:solidFill>
               </a:defRPr>
             </a:lvl1pPr>
@@ -870,7 +874,7 @@
           <p:cNvSpPr txBox="1">
             <a:spLocks/>
           </p:cNvSpPr>
-          <p:nvPr userDrawn="1"/>
+          <p:nvPr/>
         </p:nvSpPr>
         <p:spPr>
           <a:xfrm>
@@ -1091,51 +1095,11 @@
             </a:pPr>
             <a:r>
               <a:rPr lang="en-US" sz="3200" dirty="0"/>
-              <a:t>SPIKE PRIME LESSONS</a:t>
-            </a:r>
-          </a:p>
-        </p:txBody>
-      </p:sp>
-      <p:pic>
-        <p:nvPicPr>
-          <p:cNvPr id="9" name="Picture 8" descr="A picture containing drawing&#10;&#10;Description automatically generated">
-            <a:extLst>
-              <a:ext uri="{FF2B5EF4-FFF2-40B4-BE49-F238E27FC236}">
-                <a16:creationId xmlns:a16="http://schemas.microsoft.com/office/drawing/2014/main" id="{26780A6E-BC42-443E-B6EE-CF18D754C376}"/>
-              </a:ext>
-            </a:extLst>
-          </p:cNvPr>
-          <p:cNvPicPr>
-            <a:picLocks noChangeAspect="1"/>
-          </p:cNvPicPr>
-          <p:nvPr userDrawn="1"/>
-        </p:nvPicPr>
-        <p:blipFill rotWithShape="1">
-          <a:blip r:embed="rId2">
-            <a:clrChange>
-              <a:clrFrom>
-                <a:srgbClr val="000000"/>
-              </a:clrFrom>
-              <a:clrTo>
-                <a:srgbClr val="000000">
-                  <a:alpha val="0"/>
-                </a:srgbClr>
-              </a:clrTo>
-            </a:clrChange>
-          </a:blip>
-          <a:srcRect b="32885"/>
-          <a:stretch/>
-        </p:blipFill>
-        <p:spPr>
-          <a:xfrm>
-            <a:off x="179837" y="1052244"/>
-            <a:ext cx="1668346" cy="1119706"/>
-          </a:xfrm>
-          <a:prstGeom prst="rect">
-            <a:avLst/>
-          </a:prstGeom>
-        </p:spPr>
-      </p:pic>
+              <a:t>PRIME LESSONS</a:t>
+            </a:r>
+          </a:p>
+        </p:txBody>
+      </p:sp>
       <p:sp>
         <p:nvSpPr>
           <p:cNvPr id="11" name="TextBox 10">
@@ -1146,12 +1110,12 @@
             </a:extLst>
           </p:cNvPr>
           <p:cNvSpPr txBox="1"/>
-          <p:nvPr userDrawn="1"/>
-        </p:nvSpPr>
-        <p:spPr>
-          <a:xfrm>
-            <a:off x="6058605" y="737053"/>
-            <a:ext cx="2911288" cy="584775"/>
+          <p:nvPr/>
+        </p:nvSpPr>
+        <p:spPr>
+          <a:xfrm>
+            <a:off x="6331000" y="685891"/>
+            <a:ext cx="2440110" cy="307777"/>
           </a:xfrm>
           <a:prstGeom prst="rect">
             <a:avLst/>
@@ -1164,7 +1128,7 @@
           </a:bodyPr>
           <a:lstStyle/>
           <a:p>
-            <a:pPr marL="0" marR="0" lvl="0" indent="0" algn="l" defTabSz="914400" rtl="0" eaLnBrk="1" fontAlgn="auto" latinLnBrk="0" hangingPunct="1">
+            <a:pPr marL="0" marR="0" lvl="0" indent="0" algn="ctr" defTabSz="914400" rtl="0" eaLnBrk="1" fontAlgn="auto" latinLnBrk="0" hangingPunct="1">
               <a:lnSpc>
                 <a:spcPct val="100000"/>
               </a:lnSpc>
@@ -1182,191 +1146,314 @@
               <a:defRPr/>
             </a:pPr>
             <a:r>
-              <a:rPr lang="en-US" sz="1600" dirty="0"/>
-              <a:t>By the Creators of EV3Lessons</a:t>
-            </a:r>
-          </a:p>
-          <a:p>
-            <a:endParaRPr lang="en-US" sz="1600" dirty="0"/>
+              <a:rPr lang="en-US" sz="1400" dirty="0"/>
+              <a:t>By the Makers of EV3Lessons</a:t>
+            </a:r>
           </a:p>
         </p:txBody>
       </p:sp>
       <p:pic>
         <p:nvPicPr>
-          <p:cNvPr id="12" name="Picture 11" descr="A picture containing sitting, game, remote, video&#10;&#10;Description automatically generated">
+          <p:cNvPr id="18" name="Picture 17" descr="A picture containing application&#10;&#10;Description automatically generated">
             <a:extLst>
               <a:ext uri="{FF2B5EF4-FFF2-40B4-BE49-F238E27FC236}">
-                <a16:creationId xmlns:a16="http://schemas.microsoft.com/office/drawing/2014/main" id="{19D0660C-C674-40CA-9A39-C1E73533C99D}"/>
+                <a16:creationId xmlns:a16="http://schemas.microsoft.com/office/drawing/2014/main" id="{69DF8FC2-9ED1-BB44-8E96-5B069F6C6497}"/>
               </a:ext>
             </a:extLst>
           </p:cNvPr>
           <p:cNvPicPr>
             <a:picLocks noChangeAspect="1"/>
           </p:cNvPicPr>
-          <p:nvPr userDrawn="1"/>
+          <p:nvPr/>
         </p:nvPicPr>
-        <p:blipFill rotWithShape="1">
-          <a:blip r:embed="rId3">
-            <a:alphaModFix/>
-          </a:blip>
-          <a:srcRect l="24583" t="2888" r="29917" b="4667"/>
-          <a:stretch/>
+        <p:blipFill>
+          <a:blip r:embed="rId2"/>
+          <a:stretch>
+            <a:fillRect/>
+          </a:stretch>
         </p:blipFill>
         <p:spPr>
           <a:xfrm>
-            <a:off x="6058605" y="1349909"/>
-            <a:ext cx="2672408" cy="4072241"/>
+            <a:off x="7612649" y="993668"/>
+            <a:ext cx="1158461" cy="1158461"/>
           </a:xfrm>
           <a:prstGeom prst="rect">
             <a:avLst/>
           </a:prstGeom>
         </p:spPr>
       </p:pic>
-      <p:grpSp>
-        <p:nvGrpSpPr>
-          <p:cNvPr id="10" name="Group 9">
+      <p:pic>
+        <p:nvPicPr>
+          <p:cNvPr id="19" name="Picture 18" descr="Shape, square&#10;&#10;Description automatically generated">
             <a:extLst>
               <a:ext uri="{FF2B5EF4-FFF2-40B4-BE49-F238E27FC236}">
-                <a16:creationId xmlns:a16="http://schemas.microsoft.com/office/drawing/2014/main" id="{CD11A6C9-44EF-45B9-B0DD-0C82AAD7CF86}"/>
+                <a16:creationId xmlns:a16="http://schemas.microsoft.com/office/drawing/2014/main" id="{2D46D815-081F-064A-AFA6-098A6E7A3DD2}"/>
               </a:ext>
             </a:extLst>
           </p:cNvPr>
-          <p:cNvGrpSpPr/>
+          <p:cNvPicPr>
+            <a:picLocks noChangeAspect="1"/>
+          </p:cNvPicPr>
+          <p:nvPr/>
+        </p:nvPicPr>
+        <p:blipFill>
+          <a:blip r:embed="rId3"/>
+          <a:stretch>
+            <a:fillRect/>
+          </a:stretch>
+        </p:blipFill>
+        <p:spPr>
+          <a:xfrm>
+            <a:off x="6399647" y="993669"/>
+            <a:ext cx="1158461" cy="1158461"/>
+          </a:xfrm>
+          <a:prstGeom prst="rect">
+            <a:avLst/>
+          </a:prstGeom>
+        </p:spPr>
+      </p:pic>
+      <p:sp>
+        <p:nvSpPr>
+          <p:cNvPr id="9" name="Subtitle 1">
+            <a:extLst>
+              <a:ext uri="{FF2B5EF4-FFF2-40B4-BE49-F238E27FC236}">
+                <a16:creationId xmlns:a16="http://schemas.microsoft.com/office/drawing/2014/main" id="{B1CD22C7-AD87-2946-89AB-95864818EE6F}"/>
+              </a:ext>
+            </a:extLst>
+          </p:cNvPr>
+          <p:cNvSpPr txBox="1">
+            <a:spLocks/>
+          </p:cNvSpPr>
           <p:nvPr userDrawn="1"/>
-        </p:nvGrpSpPr>
-        <p:grpSpPr>
-          <a:xfrm>
-            <a:off x="179837" y="5060305"/>
-            <a:ext cx="4773538" cy="1188622"/>
-            <a:chOff x="131592" y="5034964"/>
-            <a:chExt cx="4773538" cy="1188622"/>
-          </a:xfrm>
-        </p:grpSpPr>
-        <p:pic>
-          <p:nvPicPr>
-            <p:cNvPr id="13" name="Picture 12" descr="A picture containing drawing, window&#10;&#10;Description automatically generated">
-              <a:extLst>
-                <a:ext uri="{FF2B5EF4-FFF2-40B4-BE49-F238E27FC236}">
-                  <a16:creationId xmlns:a16="http://schemas.microsoft.com/office/drawing/2014/main" id="{98032520-9308-46CA-88EA-302621EDA51D}"/>
-                </a:ext>
-              </a:extLst>
-            </p:cNvPr>
-            <p:cNvPicPr>
-              <a:picLocks noChangeAspect="1"/>
-            </p:cNvPicPr>
-            <p:nvPr userDrawn="1"/>
-          </p:nvPicPr>
-          <p:blipFill>
-            <a:blip r:embed="rId4"/>
-            <a:stretch>
-              <a:fillRect/>
-            </a:stretch>
-          </p:blipFill>
-          <p:spPr>
-            <a:xfrm>
-              <a:off x="1326564" y="5034964"/>
-              <a:ext cx="1188622" cy="1188622"/>
-            </a:xfrm>
-            <a:prstGeom prst="rect">
-              <a:avLst/>
-            </a:prstGeom>
-          </p:spPr>
-        </p:pic>
-        <p:pic>
-          <p:nvPicPr>
-            <p:cNvPr id="14" name="Picture 13" descr="A picture containing building, drawing&#10;&#10;Description automatically generated">
-              <a:extLst>
-                <a:ext uri="{FF2B5EF4-FFF2-40B4-BE49-F238E27FC236}">
-                  <a16:creationId xmlns:a16="http://schemas.microsoft.com/office/drawing/2014/main" id="{A804C157-F9A9-45CD-B278-7AC5ABDFF649}"/>
-                </a:ext>
-              </a:extLst>
-            </p:cNvPr>
-            <p:cNvPicPr>
-              <a:picLocks noChangeAspect="1"/>
-            </p:cNvPicPr>
-            <p:nvPr userDrawn="1"/>
-          </p:nvPicPr>
-          <p:blipFill>
-            <a:blip r:embed="rId5"/>
-            <a:stretch>
-              <a:fillRect/>
-            </a:stretch>
-          </p:blipFill>
-          <p:spPr>
-            <a:xfrm>
-              <a:off x="131592" y="5034964"/>
-              <a:ext cx="1188622" cy="1188622"/>
-            </a:xfrm>
-            <a:prstGeom prst="rect">
-              <a:avLst/>
-            </a:prstGeom>
-          </p:spPr>
-        </p:pic>
-        <p:pic>
-          <p:nvPicPr>
-            <p:cNvPr id="15" name="Picture 14" descr="A picture containing drawing, holding&#10;&#10;Description automatically generated">
-              <a:extLst>
-                <a:ext uri="{FF2B5EF4-FFF2-40B4-BE49-F238E27FC236}">
-                  <a16:creationId xmlns:a16="http://schemas.microsoft.com/office/drawing/2014/main" id="{D710F723-4725-419B-9685-404BC0865D10}"/>
-                </a:ext>
-              </a:extLst>
-            </p:cNvPr>
-            <p:cNvPicPr>
-              <a:picLocks noChangeAspect="1"/>
-            </p:cNvPicPr>
-            <p:nvPr userDrawn="1"/>
-          </p:nvPicPr>
-          <p:blipFill>
-            <a:blip r:embed="rId6"/>
-            <a:stretch>
-              <a:fillRect/>
-            </a:stretch>
-          </p:blipFill>
-          <p:spPr>
-            <a:xfrm>
-              <a:off x="3716508" y="5034964"/>
-              <a:ext cx="1188622" cy="1188622"/>
-            </a:xfrm>
-            <a:prstGeom prst="rect">
-              <a:avLst/>
-            </a:prstGeom>
-          </p:spPr>
-        </p:pic>
-        <p:pic>
-          <p:nvPicPr>
-            <p:cNvPr id="16" name="Picture 15" descr="A picture containing drawing, building, purple, window&#10;&#10;Description automatically generated">
-              <a:extLst>
-                <a:ext uri="{FF2B5EF4-FFF2-40B4-BE49-F238E27FC236}">
-                  <a16:creationId xmlns:a16="http://schemas.microsoft.com/office/drawing/2014/main" id="{B6B1187C-5649-4448-81FC-9F2962C28A16}"/>
-                </a:ext>
-              </a:extLst>
-            </p:cNvPr>
-            <p:cNvPicPr>
-              <a:picLocks noChangeAspect="1"/>
-            </p:cNvPicPr>
-            <p:nvPr userDrawn="1"/>
-          </p:nvPicPr>
-          <p:blipFill>
-            <a:blip r:embed="rId7"/>
-            <a:stretch>
-              <a:fillRect/>
-            </a:stretch>
-          </p:blipFill>
-          <p:spPr>
-            <a:xfrm>
-              <a:off x="2521536" y="5034964"/>
-              <a:ext cx="1188622" cy="1188622"/>
-            </a:xfrm>
-            <a:prstGeom prst="rect">
-              <a:avLst/>
-            </a:prstGeom>
-          </p:spPr>
-        </p:pic>
-      </p:grpSp>
+        </p:nvSpPr>
+        <p:spPr>
+          <a:xfrm>
+            <a:off x="4808377" y="357846"/>
+            <a:ext cx="4161516" cy="509489"/>
+          </a:xfrm>
+          <a:prstGeom prst="rect">
+            <a:avLst/>
+          </a:prstGeom>
+        </p:spPr>
+        <p:txBody>
+          <a:bodyPr vert="horz" lIns="91440" tIns="45720" rIns="91440" bIns="45720" rtlCol="0" anchor="t">
+            <a:normAutofit fontScale="92500" lnSpcReduction="10000"/>
+          </a:bodyPr>
+          <a:lstStyle>
+            <a:lvl1pPr marL="306000" indent="-306000" algn="l" defTabSz="457200" rtl="0" eaLnBrk="1" latinLnBrk="0" hangingPunct="1">
+              <a:spcBef>
+                <a:spcPct val="20000"/>
+              </a:spcBef>
+              <a:spcAft>
+                <a:spcPts val="600"/>
+              </a:spcAft>
+              <a:buClr>
+                <a:schemeClr val="accent2"/>
+              </a:buClr>
+              <a:buSzPct val="92000"/>
+              <a:buFont typeface="Wingdings 2" charset="2"/>
+              <a:buChar char=""/>
+              <a:defRPr sz="1800" kern="1200">
+                <a:solidFill>
+                  <a:schemeClr val="tx2"/>
+                </a:solidFill>
+                <a:latin typeface="+mn-lt"/>
+                <a:ea typeface="+mn-ea"/>
+                <a:cs typeface="+mn-cs"/>
+              </a:defRPr>
+            </a:lvl1pPr>
+            <a:lvl2pPr marL="630000" indent="-306000" algn="l" defTabSz="457200" rtl="0" eaLnBrk="1" latinLnBrk="0" hangingPunct="1">
+              <a:spcBef>
+                <a:spcPct val="20000"/>
+              </a:spcBef>
+              <a:spcAft>
+                <a:spcPts val="600"/>
+              </a:spcAft>
+              <a:buClr>
+                <a:schemeClr val="accent2"/>
+              </a:buClr>
+              <a:buSzPct val="92000"/>
+              <a:buFont typeface="Wingdings 2" charset="2"/>
+              <a:buChar char=""/>
+              <a:defRPr sz="1600" kern="1200">
+                <a:solidFill>
+                  <a:schemeClr val="tx2"/>
+                </a:solidFill>
+                <a:latin typeface="+mn-lt"/>
+                <a:ea typeface="+mn-ea"/>
+                <a:cs typeface="+mn-cs"/>
+              </a:defRPr>
+            </a:lvl2pPr>
+            <a:lvl3pPr marL="900000" indent="-270000" algn="l" defTabSz="457200" rtl="0" eaLnBrk="1" latinLnBrk="0" hangingPunct="1">
+              <a:spcBef>
+                <a:spcPct val="20000"/>
+              </a:spcBef>
+              <a:spcAft>
+                <a:spcPts val="600"/>
+              </a:spcAft>
+              <a:buClr>
+                <a:schemeClr val="accent2"/>
+              </a:buClr>
+              <a:buSzPct val="92000"/>
+              <a:buFont typeface="Wingdings 2" charset="2"/>
+              <a:buChar char=""/>
+              <a:defRPr sz="1400" kern="1200">
+                <a:solidFill>
+                  <a:schemeClr val="tx2"/>
+                </a:solidFill>
+                <a:latin typeface="+mn-lt"/>
+                <a:ea typeface="+mn-ea"/>
+                <a:cs typeface="+mn-cs"/>
+              </a:defRPr>
+            </a:lvl3pPr>
+            <a:lvl4pPr marL="1242000" indent="-234000" algn="l" defTabSz="457200" rtl="0" eaLnBrk="1" latinLnBrk="0" hangingPunct="1">
+              <a:spcBef>
+                <a:spcPct val="20000"/>
+              </a:spcBef>
+              <a:spcAft>
+                <a:spcPts val="600"/>
+              </a:spcAft>
+              <a:buClr>
+                <a:schemeClr val="accent2"/>
+              </a:buClr>
+              <a:buSzPct val="92000"/>
+              <a:buFont typeface="Wingdings 2" charset="2"/>
+              <a:buChar char=""/>
+              <a:defRPr sz="1200" kern="1200">
+                <a:solidFill>
+                  <a:schemeClr val="tx2"/>
+                </a:solidFill>
+                <a:latin typeface="+mn-lt"/>
+                <a:ea typeface="+mn-ea"/>
+                <a:cs typeface="+mn-cs"/>
+              </a:defRPr>
+            </a:lvl4pPr>
+            <a:lvl5pPr marL="1602000" indent="-234000" algn="l" defTabSz="457200" rtl="0" eaLnBrk="1" latinLnBrk="0" hangingPunct="1">
+              <a:spcBef>
+                <a:spcPct val="20000"/>
+              </a:spcBef>
+              <a:spcAft>
+                <a:spcPts val="600"/>
+              </a:spcAft>
+              <a:buClr>
+                <a:schemeClr val="accent2"/>
+              </a:buClr>
+              <a:buSzPct val="92000"/>
+              <a:buFont typeface="Wingdings 2" charset="2"/>
+              <a:buChar char=""/>
+              <a:defRPr sz="1200" kern="1200">
+                <a:solidFill>
+                  <a:schemeClr val="tx2"/>
+                </a:solidFill>
+                <a:latin typeface="+mn-lt"/>
+                <a:ea typeface="+mn-ea"/>
+                <a:cs typeface="+mn-cs"/>
+              </a:defRPr>
+            </a:lvl5pPr>
+            <a:lvl6pPr marL="1900000" indent="-228600" algn="l" defTabSz="457200" rtl="0" eaLnBrk="1" latinLnBrk="0" hangingPunct="1">
+              <a:spcBef>
+                <a:spcPct val="20000"/>
+              </a:spcBef>
+              <a:spcAft>
+                <a:spcPts val="600"/>
+              </a:spcAft>
+              <a:buClr>
+                <a:schemeClr val="accent2"/>
+              </a:buClr>
+              <a:buSzPct val="92000"/>
+              <a:buFont typeface="Wingdings 2" charset="2"/>
+              <a:buChar char=""/>
+              <a:defRPr sz="1200" kern="1200">
+                <a:solidFill>
+                  <a:schemeClr val="tx2"/>
+                </a:solidFill>
+                <a:latin typeface="+mn-lt"/>
+                <a:ea typeface="+mn-ea"/>
+                <a:cs typeface="+mn-cs"/>
+              </a:defRPr>
+            </a:lvl6pPr>
+            <a:lvl7pPr marL="2200000" indent="-228600" algn="l" defTabSz="457200" rtl="0" eaLnBrk="1" latinLnBrk="0" hangingPunct="1">
+              <a:spcBef>
+                <a:spcPct val="20000"/>
+              </a:spcBef>
+              <a:spcAft>
+                <a:spcPts val="600"/>
+              </a:spcAft>
+              <a:buClr>
+                <a:schemeClr val="accent2"/>
+              </a:buClr>
+              <a:buSzPct val="92000"/>
+              <a:buFont typeface="Wingdings 2" charset="2"/>
+              <a:buChar char=""/>
+              <a:defRPr sz="1200" kern="1200">
+                <a:solidFill>
+                  <a:schemeClr val="tx2"/>
+                </a:solidFill>
+                <a:latin typeface="+mn-lt"/>
+                <a:ea typeface="+mn-ea"/>
+                <a:cs typeface="+mn-cs"/>
+              </a:defRPr>
+            </a:lvl7pPr>
+            <a:lvl8pPr marL="2500000" indent="-228600" algn="l" defTabSz="457200" rtl="0" eaLnBrk="1" latinLnBrk="0" hangingPunct="1">
+              <a:spcBef>
+                <a:spcPct val="20000"/>
+              </a:spcBef>
+              <a:spcAft>
+                <a:spcPts val="600"/>
+              </a:spcAft>
+              <a:buClr>
+                <a:schemeClr val="accent2"/>
+              </a:buClr>
+              <a:buSzPct val="92000"/>
+              <a:buFont typeface="Wingdings 2" charset="2"/>
+              <a:buChar char=""/>
+              <a:defRPr sz="1200" kern="1200">
+                <a:solidFill>
+                  <a:schemeClr val="tx2"/>
+                </a:solidFill>
+                <a:latin typeface="+mn-lt"/>
+                <a:ea typeface="+mn-ea"/>
+                <a:cs typeface="+mn-cs"/>
+              </a:defRPr>
+            </a:lvl8pPr>
+            <a:lvl9pPr marL="2800000" indent="-228600" algn="l" defTabSz="457200" rtl="0" eaLnBrk="1" latinLnBrk="0" hangingPunct="1">
+              <a:spcBef>
+                <a:spcPct val="20000"/>
+              </a:spcBef>
+              <a:spcAft>
+                <a:spcPts val="600"/>
+              </a:spcAft>
+              <a:buClr>
+                <a:schemeClr val="accent2"/>
+              </a:buClr>
+              <a:buSzPct val="92000"/>
+              <a:buFont typeface="Wingdings 2" panose="05020102010507070707" pitchFamily="18" charset="2"/>
+              <a:buChar char=""/>
+              <a:defRPr sz="1200" kern="1200">
+                <a:solidFill>
+                  <a:schemeClr val="tx2"/>
+                </a:solidFill>
+                <a:latin typeface="+mn-lt"/>
+                <a:ea typeface="+mn-ea"/>
+                <a:cs typeface="+mn-cs"/>
+              </a:defRPr>
+            </a:lvl9pPr>
+          </a:lstStyle>
+          <a:p>
+            <a:pPr marL="0" indent="0" algn="r">
+              <a:buNone/>
+            </a:pPr>
+            <a:r>
+              <a:rPr lang="en-US" sz="3200" dirty="0"/>
+              <a:t>PRIME LESSONS</a:t>
+            </a:r>
+          </a:p>
+        </p:txBody>
+      </p:sp>
     </p:spTree>
     <p:extLst>
       <p:ext uri="{BB962C8B-B14F-4D97-AF65-F5344CB8AC3E}">
-        <p14:creationId xmlns:p14="http://schemas.microsoft.com/office/powerpoint/2010/main" val="2462555266"/>
+        <p14:creationId xmlns:p14="http://schemas.microsoft.com/office/powerpoint/2010/main" val="310311245"/>
       </p:ext>
     </p:extLst>
   </p:cSld>
@@ -1615,7 +1702,7 @@
     </p:spTree>
     <p:extLst>
       <p:ext uri="{BB962C8B-B14F-4D97-AF65-F5344CB8AC3E}">
-        <p14:creationId xmlns:p14="http://schemas.microsoft.com/office/powerpoint/2010/main" val="383043856"/>
+        <p14:creationId xmlns:p14="http://schemas.microsoft.com/office/powerpoint/2010/main" val="3873749860"/>
       </p:ext>
     </p:extLst>
   </p:cSld>
@@ -1880,7 +1967,7 @@
     </p:spTree>
     <p:extLst>
       <p:ext uri="{BB962C8B-B14F-4D97-AF65-F5344CB8AC3E}">
-        <p14:creationId xmlns:p14="http://schemas.microsoft.com/office/powerpoint/2010/main" val="103737683"/>
+        <p14:creationId xmlns:p14="http://schemas.microsoft.com/office/powerpoint/2010/main" val="4229772430"/>
       </p:ext>
     </p:extLst>
   </p:cSld>
@@ -1890,786 +1977,9 @@
 </p:sldLayout>
 </file>
 
-<file path=ppt/slideLayouts/slideLayout2.xml><?xml version="1.0" encoding="utf-8"?>
-<p:sldLayout xmlns:a="http://schemas.openxmlformats.org/drawingml/2006/main" xmlns:r="http://schemas.openxmlformats.org/officeDocument/2006/relationships" xmlns:p="http://schemas.openxmlformats.org/presentationml/2006/main" type="obj" preserve="1">
-  <p:cSld name="Title and Content">
-    <p:spTree>
-      <p:nvGrpSpPr>
-        <p:cNvPr id="1" name=""/>
-        <p:cNvGrpSpPr/>
-        <p:nvPr/>
-      </p:nvGrpSpPr>
-      <p:grpSpPr>
-        <a:xfrm>
-          <a:off x="0" y="0"/>
-          <a:ext cx="0" cy="0"/>
-          <a:chOff x="0" y="0"/>
-          <a:chExt cx="0" cy="0"/>
-        </a:xfrm>
-      </p:grpSpPr>
-      <p:sp>
-        <p:nvSpPr>
-          <p:cNvPr id="7" name="Rectangle 6"/>
-          <p:cNvSpPr>
-            <a:spLocks noChangeAspect="1"/>
-          </p:cNvSpPr>
-          <p:nvPr/>
-        </p:nvSpPr>
-        <p:spPr>
-          <a:xfrm>
-            <a:off x="142200" y="249101"/>
-            <a:ext cx="8831579" cy="840455"/>
-          </a:xfrm>
-          <a:prstGeom prst="rect">
-            <a:avLst/>
-          </a:prstGeom>
-          <a:solidFill>
-            <a:schemeClr val="accent1"/>
-          </a:solidFill>
-          <a:ln>
-            <a:noFill/>
-          </a:ln>
-          <a:effectLst/>
-        </p:spPr>
-        <p:style>
-          <a:lnRef idx="1">
-            <a:schemeClr val="accent1"/>
-          </a:lnRef>
-          <a:fillRef idx="3">
-            <a:schemeClr val="accent1"/>
-          </a:fillRef>
-          <a:effectRef idx="2">
-            <a:schemeClr val="accent1"/>
-          </a:effectRef>
-          <a:fontRef idx="minor">
-            <a:schemeClr val="lt1"/>
-          </a:fontRef>
-        </p:style>
-        <p:txBody>
-          <a:bodyPr/>
-          <a:lstStyle/>
-          <a:p>
-            <a:endParaRPr lang="en-US" dirty="0"/>
-          </a:p>
-        </p:txBody>
-      </p:sp>
-      <p:sp>
-        <p:nvSpPr>
-          <p:cNvPr id="2" name="Title 1"/>
-          <p:cNvSpPr>
-            <a:spLocks noGrp="1"/>
-          </p:cNvSpPr>
-          <p:nvPr>
-            <p:ph type="title"/>
-          </p:nvPr>
-        </p:nvSpPr>
-        <p:spPr>
-          <a:xfrm>
-            <a:off x="175260" y="292975"/>
-            <a:ext cx="8746864" cy="752706"/>
-          </a:xfrm>
-        </p:spPr>
-        <p:txBody>
-          <a:bodyPr anchor="t"/>
-          <a:lstStyle>
-            <a:lvl1pPr>
-              <a:defRPr>
-                <a:solidFill>
-                  <a:schemeClr val="tx1"/>
-                </a:solidFill>
-              </a:defRPr>
-            </a:lvl1pPr>
-          </a:lstStyle>
-          <a:p>
-            <a:r>
-              <a:rPr lang="en-US" dirty="0"/>
-              <a:t>Click to edit Master title style</a:t>
-            </a:r>
-          </a:p>
-        </p:txBody>
-      </p:sp>
-      <p:sp>
-        <p:nvSpPr>
-          <p:cNvPr id="3" name="Content Placeholder 2"/>
-          <p:cNvSpPr>
-            <a:spLocks noGrp="1"/>
-          </p:cNvSpPr>
-          <p:nvPr>
-            <p:ph idx="1"/>
-          </p:nvPr>
-        </p:nvSpPr>
-        <p:spPr>
-          <a:xfrm>
-            <a:off x="155088" y="1140006"/>
-            <a:ext cx="8831580" cy="5082601"/>
-          </a:xfrm>
-        </p:spPr>
-        <p:txBody>
-          <a:bodyPr/>
-          <a:lstStyle/>
-          <a:p>
-            <a:pPr lvl="0"/>
-            <a:r>
-              <a:rPr lang="en-US" dirty="0"/>
-              <a:t>Click to edit Master text styles</a:t>
-            </a:r>
-          </a:p>
-          <a:p>
-            <a:pPr lvl="1"/>
-            <a:r>
-              <a:rPr lang="en-US" dirty="0"/>
-              <a:t>Second level</a:t>
-            </a:r>
-          </a:p>
-          <a:p>
-            <a:pPr lvl="2"/>
-            <a:r>
-              <a:rPr lang="en-US" dirty="0"/>
-              <a:t>Third level</a:t>
-            </a:r>
-          </a:p>
-          <a:p>
-            <a:pPr lvl="3"/>
-            <a:r>
-              <a:rPr lang="en-US" dirty="0"/>
-              <a:t>Fourth level</a:t>
-            </a:r>
-          </a:p>
-          <a:p>
-            <a:pPr lvl="4"/>
-            <a:r>
-              <a:rPr lang="en-US" dirty="0"/>
-              <a:t>Fifth level</a:t>
-            </a:r>
-          </a:p>
-        </p:txBody>
-      </p:sp>
-      <p:sp>
-        <p:nvSpPr>
-          <p:cNvPr id="5" name="Footer Placeholder 4"/>
-          <p:cNvSpPr>
-            <a:spLocks noGrp="1"/>
-          </p:cNvSpPr>
-          <p:nvPr>
-            <p:ph type="ftr" sz="quarter" idx="11"/>
-          </p:nvPr>
-        </p:nvSpPr>
-        <p:spPr>
-          <a:xfrm>
-            <a:off x="88409" y="6321349"/>
-            <a:ext cx="4870585" cy="365125"/>
-          </a:xfrm>
-          <a:prstGeom prst="rect">
-            <a:avLst/>
-          </a:prstGeom>
-        </p:spPr>
-        <p:txBody>
-          <a:bodyPr/>
-          <a:lstStyle>
-            <a:lvl1pPr>
-              <a:defRPr sz="900"/>
-            </a:lvl1pPr>
-          </a:lstStyle>
-          <a:p>
-            <a:r>
-              <a:rPr lang="en-GB"/>
-              <a:t>Copyright © 2020 SPIKE Prime Lessons (primelessons.org) CC-BY-NC-SA.  (Last edit: 11/23/2020)</a:t>
-            </a:r>
-            <a:endParaRPr lang="en-US" dirty="0"/>
-          </a:p>
-        </p:txBody>
-      </p:sp>
-      <p:sp>
-        <p:nvSpPr>
-          <p:cNvPr id="6" name="Slide Number Placeholder 5"/>
-          <p:cNvSpPr>
-            <a:spLocks noGrp="1"/>
-          </p:cNvSpPr>
-          <p:nvPr>
-            <p:ph type="sldNum" sz="quarter" idx="12"/>
-          </p:nvPr>
-        </p:nvSpPr>
-        <p:spPr>
-          <a:xfrm>
-            <a:off x="8236372" y="6317217"/>
-            <a:ext cx="770468" cy="365125"/>
-          </a:xfrm>
-          <a:prstGeom prst="rect">
-            <a:avLst/>
-          </a:prstGeom>
-        </p:spPr>
-        <p:txBody>
-          <a:bodyPr/>
-          <a:lstStyle/>
-          <a:p>
-            <a:fld id="{BBD74847-7BE4-4E4D-8159-51DF7B93C616}" type="slidenum">
-              <a:rPr lang="en-US" smtClean="0"/>
-              <a:t>‹#›</a:t>
-            </a:fld>
-            <a:endParaRPr lang="en-US"/>
-          </a:p>
-        </p:txBody>
-      </p:sp>
-      <p:cxnSp>
-        <p:nvCxnSpPr>
-          <p:cNvPr id="9" name="Straight Connector 8">
-            <a:extLst>
-              <a:ext uri="{FF2B5EF4-FFF2-40B4-BE49-F238E27FC236}">
-                <a16:creationId xmlns:a16="http://schemas.microsoft.com/office/drawing/2014/main" id="{D59C872A-C57F-4B1F-AFD0-FDF125C3C485}"/>
-              </a:ext>
-            </a:extLst>
-          </p:cNvPr>
-          <p:cNvCxnSpPr/>
-          <p:nvPr userDrawn="1"/>
-        </p:nvCxnSpPr>
-        <p:spPr>
-          <a:xfrm>
-            <a:off x="175260" y="6316935"/>
-            <a:ext cx="8831580" cy="0"/>
-          </a:xfrm>
-          <a:prstGeom prst="line">
-            <a:avLst/>
-          </a:prstGeom>
-        </p:spPr>
-        <p:style>
-          <a:lnRef idx="1">
-            <a:schemeClr val="dk1"/>
-          </a:lnRef>
-          <a:fillRef idx="0">
-            <a:schemeClr val="dk1"/>
-          </a:fillRef>
-          <a:effectRef idx="0">
-            <a:schemeClr val="dk1"/>
-          </a:effectRef>
-          <a:fontRef idx="minor">
-            <a:schemeClr val="tx1"/>
-          </a:fontRef>
-        </p:style>
-      </p:cxnSp>
-    </p:spTree>
-    <p:extLst>
-      <p:ext uri="{BB962C8B-B14F-4D97-AF65-F5344CB8AC3E}">
-        <p14:creationId xmlns:p14="http://schemas.microsoft.com/office/powerpoint/2010/main" val="1690037162"/>
-      </p:ext>
-    </p:extLst>
-  </p:cSld>
-  <p:clrMapOvr>
-    <a:masterClrMapping/>
-  </p:clrMapOvr>
-</p:sldLayout>
-</file>
-
-<file path=ppt/slideLayouts/slideLayout3.xml><?xml version="1.0" encoding="utf-8"?>
-<p:sldLayout xmlns:a="http://schemas.openxmlformats.org/drawingml/2006/main" xmlns:r="http://schemas.openxmlformats.org/officeDocument/2006/relationships" xmlns:p="http://schemas.openxmlformats.org/presentationml/2006/main" type="secHead" preserve="1">
-  <p:cSld name="Section Header">
-    <p:spTree>
-      <p:nvGrpSpPr>
-        <p:cNvPr id="1" name=""/>
-        <p:cNvGrpSpPr/>
-        <p:nvPr/>
-      </p:nvGrpSpPr>
-      <p:grpSpPr>
-        <a:xfrm>
-          <a:off x="0" y="0"/>
-          <a:ext cx="0" cy="0"/>
-          <a:chOff x="0" y="0"/>
-          <a:chExt cx="0" cy="0"/>
-        </a:xfrm>
-      </p:grpSpPr>
-      <p:sp>
-        <p:nvSpPr>
-          <p:cNvPr id="8" name="Rectangle 7"/>
-          <p:cNvSpPr>
-            <a:spLocks noChangeAspect="1"/>
-          </p:cNvSpPr>
-          <p:nvPr/>
-        </p:nvSpPr>
-        <p:spPr>
-          <a:xfrm>
-            <a:off x="452646" y="5141973"/>
-            <a:ext cx="8238707" cy="1258827"/>
-          </a:xfrm>
-          <a:prstGeom prst="rect">
-            <a:avLst/>
-          </a:prstGeom>
-          <a:solidFill>
-            <a:schemeClr val="accent1"/>
-          </a:solidFill>
-          <a:ln>
-            <a:noFill/>
-          </a:ln>
-          <a:effectLst/>
-        </p:spPr>
-        <p:style>
-          <a:lnRef idx="1">
-            <a:schemeClr val="accent1"/>
-          </a:lnRef>
-          <a:fillRef idx="3">
-            <a:schemeClr val="accent1"/>
-          </a:fillRef>
-          <a:effectRef idx="2">
-            <a:schemeClr val="accent1"/>
-          </a:effectRef>
-          <a:fontRef idx="minor">
-            <a:schemeClr val="lt1"/>
-          </a:fontRef>
-        </p:style>
-      </p:sp>
-      <p:sp>
-        <p:nvSpPr>
-          <p:cNvPr id="2" name="Title 1"/>
-          <p:cNvSpPr>
-            <a:spLocks noGrp="1"/>
-          </p:cNvSpPr>
-          <p:nvPr>
-            <p:ph type="title"/>
-          </p:nvPr>
-        </p:nvSpPr>
-        <p:spPr>
-          <a:xfrm>
-            <a:off x="581193" y="3036573"/>
-            <a:ext cx="7989751" cy="1504844"/>
-          </a:xfrm>
-        </p:spPr>
-        <p:txBody>
-          <a:bodyPr anchor="b">
-            <a:normAutofit/>
-          </a:bodyPr>
-          <a:lstStyle>
-            <a:lvl1pPr algn="l">
-              <a:defRPr sz="3600" b="0" cap="all">
-                <a:solidFill>
-                  <a:schemeClr val="accent1"/>
-                </a:solidFill>
-              </a:defRPr>
-            </a:lvl1pPr>
-          </a:lstStyle>
-          <a:p>
-            <a:r>
-              <a:rPr lang="en-US"/>
-              <a:t>Click to edit Master title style</a:t>
-            </a:r>
-            <a:endParaRPr lang="en-US" dirty="0"/>
-          </a:p>
-        </p:txBody>
-      </p:sp>
-      <p:sp>
-        <p:nvSpPr>
-          <p:cNvPr id="3" name="Text Placeholder 2"/>
-          <p:cNvSpPr>
-            <a:spLocks noGrp="1"/>
-          </p:cNvSpPr>
-          <p:nvPr>
-            <p:ph type="body" idx="1"/>
-          </p:nvPr>
-        </p:nvSpPr>
-        <p:spPr>
-          <a:xfrm>
-            <a:off x="581193" y="4541417"/>
-            <a:ext cx="7989751" cy="600556"/>
-          </a:xfrm>
-        </p:spPr>
-        <p:txBody>
-          <a:bodyPr anchor="t">
-            <a:normAutofit/>
-          </a:bodyPr>
-          <a:lstStyle>
-            <a:lvl1pPr marL="0" indent="0" algn="l">
-              <a:buNone/>
-              <a:defRPr sz="1800" cap="all">
-                <a:solidFill>
-                  <a:schemeClr val="accent2"/>
-                </a:solidFill>
-              </a:defRPr>
-            </a:lvl1pPr>
-            <a:lvl2pPr marL="457200" indent="0">
-              <a:buNone/>
-              <a:defRPr sz="1800">
-                <a:solidFill>
-                  <a:schemeClr val="tx1">
-                    <a:tint val="75000"/>
-                  </a:schemeClr>
-                </a:solidFill>
-              </a:defRPr>
-            </a:lvl2pPr>
-            <a:lvl3pPr marL="914400" indent="0">
-              <a:buNone/>
-              <a:defRPr sz="1600">
-                <a:solidFill>
-                  <a:schemeClr val="tx1">
-                    <a:tint val="75000"/>
-                  </a:schemeClr>
-                </a:solidFill>
-              </a:defRPr>
-            </a:lvl3pPr>
-            <a:lvl4pPr marL="1371600" indent="0">
-              <a:buNone/>
-              <a:defRPr sz="1400">
-                <a:solidFill>
-                  <a:schemeClr val="tx1">
-                    <a:tint val="75000"/>
-                  </a:schemeClr>
-                </a:solidFill>
-              </a:defRPr>
-            </a:lvl4pPr>
-            <a:lvl5pPr marL="1828800" indent="0">
-              <a:buNone/>
-              <a:defRPr sz="1400">
-                <a:solidFill>
-                  <a:schemeClr val="tx1">
-                    <a:tint val="75000"/>
-                  </a:schemeClr>
-                </a:solidFill>
-              </a:defRPr>
-            </a:lvl5pPr>
-            <a:lvl6pPr marL="2286000" indent="0">
-              <a:buNone/>
-              <a:defRPr sz="1400">
-                <a:solidFill>
-                  <a:schemeClr val="tx1">
-                    <a:tint val="75000"/>
-                  </a:schemeClr>
-                </a:solidFill>
-              </a:defRPr>
-            </a:lvl6pPr>
-            <a:lvl7pPr marL="2743200" indent="0">
-              <a:buNone/>
-              <a:defRPr sz="1400">
-                <a:solidFill>
-                  <a:schemeClr val="tx1">
-                    <a:tint val="75000"/>
-                  </a:schemeClr>
-                </a:solidFill>
-              </a:defRPr>
-            </a:lvl7pPr>
-            <a:lvl8pPr marL="3200400" indent="0">
-              <a:buNone/>
-              <a:defRPr sz="1400">
-                <a:solidFill>
-                  <a:schemeClr val="tx1">
-                    <a:tint val="75000"/>
-                  </a:schemeClr>
-                </a:solidFill>
-              </a:defRPr>
-            </a:lvl8pPr>
-            <a:lvl9pPr marL="3657600" indent="0">
-              <a:buNone/>
-              <a:defRPr sz="1400">
-                <a:solidFill>
-                  <a:schemeClr val="tx1">
-                    <a:tint val="75000"/>
-                  </a:schemeClr>
-                </a:solidFill>
-              </a:defRPr>
-            </a:lvl9pPr>
-          </a:lstStyle>
-          <a:p>
-            <a:pPr lvl="0"/>
-            <a:r>
-              <a:rPr lang="en-US"/>
-              <a:t>Click to edit Master text styles</a:t>
-            </a:r>
-          </a:p>
-        </p:txBody>
-      </p:sp>
-      <p:sp>
-        <p:nvSpPr>
-          <p:cNvPr id="4" name="Date Placeholder 3"/>
-          <p:cNvSpPr>
-            <a:spLocks noGrp="1"/>
-          </p:cNvSpPr>
-          <p:nvPr>
-            <p:ph type="dt" sz="half" idx="10"/>
-          </p:nvPr>
-        </p:nvSpPr>
-        <p:spPr>
-          <a:xfrm>
-            <a:off x="5559327" y="5956136"/>
-            <a:ext cx="2133600" cy="365125"/>
-          </a:xfrm>
-          <a:prstGeom prst="rect">
-            <a:avLst/>
-          </a:prstGeom>
-        </p:spPr>
-        <p:txBody>
-          <a:bodyPr/>
-          <a:lstStyle>
-            <a:lvl1pPr>
-              <a:defRPr>
-                <a:solidFill>
-                  <a:schemeClr val="accent1">
-                    <a:lumMod val="75000"/>
-                    <a:lumOff val="25000"/>
-                  </a:schemeClr>
-                </a:solidFill>
-              </a:defRPr>
-            </a:lvl1pPr>
-          </a:lstStyle>
-          <a:p>
-            <a:endParaRPr lang="en-US"/>
-          </a:p>
-        </p:txBody>
-      </p:sp>
-      <p:sp>
-        <p:nvSpPr>
-          <p:cNvPr id="5" name="Footer Placeholder 4"/>
-          <p:cNvSpPr>
-            <a:spLocks noGrp="1"/>
-          </p:cNvSpPr>
-          <p:nvPr>
-            <p:ph type="ftr" sz="quarter" idx="11"/>
-          </p:nvPr>
-        </p:nvSpPr>
-        <p:spPr>
-          <a:xfrm>
-            <a:off x="581192" y="5951810"/>
-            <a:ext cx="4870585" cy="365125"/>
-          </a:xfrm>
-          <a:prstGeom prst="rect">
-            <a:avLst/>
-          </a:prstGeom>
-        </p:spPr>
-        <p:txBody>
-          <a:bodyPr/>
-          <a:lstStyle>
-            <a:lvl1pPr>
-              <a:defRPr>
-                <a:solidFill>
-                  <a:schemeClr val="accent1">
-                    <a:lumMod val="75000"/>
-                    <a:lumOff val="25000"/>
-                  </a:schemeClr>
-                </a:solidFill>
-              </a:defRPr>
-            </a:lvl1pPr>
-          </a:lstStyle>
-          <a:p>
-            <a:r>
-              <a:rPr lang="en-GB"/>
-              <a:t>Copyright © 2020 SPIKE Prime Lessons (primelessons.org) CC-BY-NC-SA.  (Last edit: 11/23/2020)</a:t>
-            </a:r>
-            <a:endParaRPr lang="en-US" dirty="0"/>
-          </a:p>
-        </p:txBody>
-      </p:sp>
-      <p:sp>
-        <p:nvSpPr>
-          <p:cNvPr id="6" name="Slide Number Placeholder 5"/>
-          <p:cNvSpPr>
-            <a:spLocks noGrp="1"/>
-          </p:cNvSpPr>
-          <p:nvPr>
-            <p:ph type="sldNum" sz="quarter" idx="12"/>
-          </p:nvPr>
-        </p:nvSpPr>
-        <p:spPr>
-          <a:xfrm>
-            <a:off x="7800476" y="5956136"/>
-            <a:ext cx="770468" cy="365125"/>
-          </a:xfrm>
-          <a:prstGeom prst="rect">
-            <a:avLst/>
-          </a:prstGeom>
-        </p:spPr>
-        <p:txBody>
-          <a:bodyPr/>
-          <a:lstStyle>
-            <a:lvl1pPr>
-              <a:defRPr>
-                <a:solidFill>
-                  <a:schemeClr val="accent1">
-                    <a:lumMod val="75000"/>
-                    <a:lumOff val="25000"/>
-                  </a:schemeClr>
-                </a:solidFill>
-              </a:defRPr>
-            </a:lvl1pPr>
-          </a:lstStyle>
-          <a:p>
-            <a:fld id="{BBD74847-7BE4-4E4D-8159-51DF7B93C616}" type="slidenum">
-              <a:rPr lang="en-US" smtClean="0"/>
-              <a:t>‹#›</a:t>
-            </a:fld>
-            <a:endParaRPr lang="en-US"/>
-          </a:p>
-        </p:txBody>
-      </p:sp>
-      <p:sp>
-        <p:nvSpPr>
-          <p:cNvPr id="11" name="Rectangle 10">
-            <a:extLst>
-              <a:ext uri="{FF2B5EF4-FFF2-40B4-BE49-F238E27FC236}">
-                <a16:creationId xmlns:a16="http://schemas.microsoft.com/office/drawing/2014/main" id="{A9F621E0-AEE7-4799-81EB-EB99ED60C8DF}"/>
-              </a:ext>
-            </a:extLst>
-          </p:cNvPr>
-          <p:cNvSpPr>
-            <a:spLocks noChangeAspect="1"/>
-          </p:cNvSpPr>
-          <p:nvPr userDrawn="1"/>
-        </p:nvSpPr>
-        <p:spPr>
-          <a:xfrm>
-            <a:off x="142200" y="249101"/>
-            <a:ext cx="8831579" cy="840455"/>
-          </a:xfrm>
-          <a:prstGeom prst="rect">
-            <a:avLst/>
-          </a:prstGeom>
-          <a:solidFill>
-            <a:schemeClr val="accent1"/>
-          </a:solidFill>
-          <a:ln>
-            <a:noFill/>
-          </a:ln>
-          <a:effectLst/>
-        </p:spPr>
-        <p:style>
-          <a:lnRef idx="1">
-            <a:schemeClr val="accent1"/>
-          </a:lnRef>
-          <a:fillRef idx="3">
-            <a:schemeClr val="accent1"/>
-          </a:fillRef>
-          <a:effectRef idx="2">
-            <a:schemeClr val="accent1"/>
-          </a:effectRef>
-          <a:fontRef idx="minor">
-            <a:schemeClr val="lt1"/>
-          </a:fontRef>
-        </p:style>
-        <p:txBody>
-          <a:bodyPr/>
-          <a:lstStyle/>
-          <a:p>
-            <a:endParaRPr lang="en-US" dirty="0"/>
-          </a:p>
-        </p:txBody>
-      </p:sp>
-      <p:sp>
-        <p:nvSpPr>
-          <p:cNvPr id="12" name="Title 1">
-            <a:extLst>
-              <a:ext uri="{FF2B5EF4-FFF2-40B4-BE49-F238E27FC236}">
-                <a16:creationId xmlns:a16="http://schemas.microsoft.com/office/drawing/2014/main" id="{B40FAB25-E17C-4189-8846-137BC28A1EB3}"/>
-              </a:ext>
-            </a:extLst>
-          </p:cNvPr>
-          <p:cNvSpPr txBox="1">
-            <a:spLocks/>
-          </p:cNvSpPr>
-          <p:nvPr userDrawn="1"/>
-        </p:nvSpPr>
-        <p:spPr>
-          <a:xfrm>
-            <a:off x="175260" y="292975"/>
-            <a:ext cx="8746864" cy="752706"/>
-          </a:xfrm>
-          <a:prstGeom prst="rect">
-            <a:avLst/>
-          </a:prstGeom>
-        </p:spPr>
-        <p:txBody>
-          <a:bodyPr vert="horz" lIns="91440" tIns="45720" rIns="91440" bIns="45720" rtlCol="0" anchor="t">
-            <a:normAutofit/>
-          </a:bodyPr>
-          <a:lstStyle>
-            <a:lvl1pPr algn="l" defTabSz="457200" rtl="0" eaLnBrk="1" latinLnBrk="0" hangingPunct="1">
-              <a:spcBef>
-                <a:spcPct val="0"/>
-              </a:spcBef>
-              <a:buNone/>
-              <a:defRPr sz="2800" b="0" kern="1200" cap="all">
-                <a:solidFill>
-                  <a:schemeClr val="tx1"/>
-                </a:solidFill>
-                <a:latin typeface="+mj-lt"/>
-                <a:ea typeface="+mj-ea"/>
-                <a:cs typeface="+mj-cs"/>
-              </a:defRPr>
-            </a:lvl1pPr>
-            <a:lvl2pPr eaLnBrk="1" hangingPunct="1">
-              <a:defRPr>
-                <a:solidFill>
-                  <a:schemeClr val="tx2"/>
-                </a:solidFill>
-              </a:defRPr>
-            </a:lvl2pPr>
-            <a:lvl3pPr eaLnBrk="1" hangingPunct="1">
-              <a:defRPr>
-                <a:solidFill>
-                  <a:schemeClr val="tx2"/>
-                </a:solidFill>
-              </a:defRPr>
-            </a:lvl3pPr>
-            <a:lvl4pPr eaLnBrk="1" hangingPunct="1">
-              <a:defRPr>
-                <a:solidFill>
-                  <a:schemeClr val="tx2"/>
-                </a:solidFill>
-              </a:defRPr>
-            </a:lvl4pPr>
-            <a:lvl5pPr eaLnBrk="1" hangingPunct="1">
-              <a:defRPr>
-                <a:solidFill>
-                  <a:schemeClr val="tx2"/>
-                </a:solidFill>
-              </a:defRPr>
-            </a:lvl5pPr>
-            <a:lvl6pPr eaLnBrk="1" hangingPunct="1">
-              <a:defRPr>
-                <a:solidFill>
-                  <a:schemeClr val="tx2"/>
-                </a:solidFill>
-              </a:defRPr>
-            </a:lvl6pPr>
-            <a:lvl7pPr eaLnBrk="1" hangingPunct="1">
-              <a:defRPr>
-                <a:solidFill>
-                  <a:schemeClr val="tx2"/>
-                </a:solidFill>
-              </a:defRPr>
-            </a:lvl7pPr>
-            <a:lvl8pPr eaLnBrk="1" hangingPunct="1">
-              <a:defRPr>
-                <a:solidFill>
-                  <a:schemeClr val="tx2"/>
-                </a:solidFill>
-              </a:defRPr>
-            </a:lvl8pPr>
-            <a:lvl9pPr eaLnBrk="1" hangingPunct="1">
-              <a:defRPr>
-                <a:solidFill>
-                  <a:schemeClr val="tx2"/>
-                </a:solidFill>
-              </a:defRPr>
-            </a:lvl9pPr>
-          </a:lstStyle>
-          <a:p>
-            <a:r>
-              <a:rPr lang="en-US"/>
-              <a:t>Click to edit Master title style</a:t>
-            </a:r>
-            <a:endParaRPr lang="en-US" dirty="0"/>
-          </a:p>
-        </p:txBody>
-      </p:sp>
-    </p:spTree>
-    <p:extLst>
-      <p:ext uri="{BB962C8B-B14F-4D97-AF65-F5344CB8AC3E}">
-        <p14:creationId xmlns:p14="http://schemas.microsoft.com/office/powerpoint/2010/main" val="709269958"/>
-      </p:ext>
-    </p:extLst>
-  </p:cSld>
-  <p:clrMapOvr>
-    <a:masterClrMapping/>
-  </p:clrMapOvr>
-</p:sldLayout>
-</file>
-
-<file path=ppt/slideLayouts/slideLayout4.xml><?xml version="1.0" encoding="utf-8"?>
+<file path=ppt/slideLayouts/slideLayout12.xml><?xml version="1.0" encoding="utf-8"?>
 <p:sldLayout xmlns:a="http://schemas.openxmlformats.org/drawingml/2006/main" xmlns:r="http://schemas.openxmlformats.org/officeDocument/2006/relationships" xmlns:p="http://schemas.openxmlformats.org/presentationml/2006/main" preserve="1" userDrawn="1">
-  <p:cSld name="Two Content">
+  <p:cSld name="1_Two Content">
     <p:spTree>
       <p:nvGrpSpPr>
         <p:cNvPr id="1" name=""/>
@@ -3050,9 +2360,9 @@
 </p:sldLayout>
 </file>
 
-<file path=ppt/slideLayouts/slideLayout5.xml><?xml version="1.0" encoding="utf-8"?>
+<file path=ppt/slideLayouts/slideLayout13.xml><?xml version="1.0" encoding="utf-8"?>
 <p:sldLayout xmlns:a="http://schemas.openxmlformats.org/drawingml/2006/main" xmlns:r="http://schemas.openxmlformats.org/officeDocument/2006/relationships" xmlns:p="http://schemas.openxmlformats.org/presentationml/2006/main" preserve="1" userDrawn="1">
-  <p:cSld name="Comparison">
+  <p:cSld name="1_Comparison">
     <p:spTree>
       <p:nvGrpSpPr>
         <p:cNvPr id="1" name=""/>
@@ -3522,8 +2832,2446 @@
 </p:sldLayout>
 </file>
 
+<file path=ppt/slideLayouts/slideLayout14.xml><?xml version="1.0" encoding="utf-8"?>
+<p:sldLayout xmlns:a="http://schemas.openxmlformats.org/drawingml/2006/main" xmlns:r="http://schemas.openxmlformats.org/officeDocument/2006/relationships" xmlns:p="http://schemas.openxmlformats.org/presentationml/2006/main" preserve="1" userDrawn="1">
+  <p:cSld name="1_Title Only">
+    <p:spTree>
+      <p:nvGrpSpPr>
+        <p:cNvPr id="1" name=""/>
+        <p:cNvGrpSpPr/>
+        <p:nvPr/>
+      </p:nvGrpSpPr>
+      <p:grpSpPr>
+        <a:xfrm>
+          <a:off x="0" y="0"/>
+          <a:ext cx="0" cy="0"/>
+          <a:chOff x="0" y="0"/>
+          <a:chExt cx="0" cy="0"/>
+        </a:xfrm>
+      </p:grpSpPr>
+      <p:sp>
+        <p:nvSpPr>
+          <p:cNvPr id="7" name="Footer Placeholder 4">
+            <a:extLst>
+              <a:ext uri="{FF2B5EF4-FFF2-40B4-BE49-F238E27FC236}">
+                <a16:creationId xmlns:a16="http://schemas.microsoft.com/office/drawing/2014/main" id="{42632993-FC7F-42E0-9D01-6C58965FB8BB}"/>
+              </a:ext>
+            </a:extLst>
+          </p:cNvPr>
+          <p:cNvSpPr>
+            <a:spLocks noGrp="1"/>
+          </p:cNvSpPr>
+          <p:nvPr>
+            <p:ph type="ftr" sz="quarter" idx="11"/>
+          </p:nvPr>
+        </p:nvSpPr>
+        <p:spPr>
+          <a:xfrm>
+            <a:off x="88409" y="6266485"/>
+            <a:ext cx="4870585" cy="365125"/>
+          </a:xfrm>
+          <a:prstGeom prst="rect">
+            <a:avLst/>
+          </a:prstGeom>
+        </p:spPr>
+        <p:txBody>
+          <a:bodyPr/>
+          <a:lstStyle/>
+          <a:p>
+            <a:r>
+              <a:rPr lang="en-GB"/>
+              <a:t>Copyright © 2020 SPIKE Prime Lessons (primelessons.org) CC-BY-NC-SA.  (Last edit: 11/23/2020)</a:t>
+            </a:r>
+            <a:endParaRPr lang="en-US" dirty="0"/>
+          </a:p>
+        </p:txBody>
+      </p:sp>
+      <p:sp>
+        <p:nvSpPr>
+          <p:cNvPr id="8" name="Slide Number Placeholder 5">
+            <a:extLst>
+              <a:ext uri="{FF2B5EF4-FFF2-40B4-BE49-F238E27FC236}">
+                <a16:creationId xmlns:a16="http://schemas.microsoft.com/office/drawing/2014/main" id="{57B8D68D-165F-4007-99ED-9807B7E8CBDC}"/>
+              </a:ext>
+            </a:extLst>
+          </p:cNvPr>
+          <p:cNvSpPr>
+            <a:spLocks noGrp="1"/>
+          </p:cNvSpPr>
+          <p:nvPr>
+            <p:ph type="sldNum" sz="quarter" idx="12"/>
+          </p:nvPr>
+        </p:nvSpPr>
+        <p:spPr>
+          <a:xfrm>
+            <a:off x="8236372" y="6280641"/>
+            <a:ext cx="770468" cy="365125"/>
+          </a:xfrm>
+          <a:prstGeom prst="rect">
+            <a:avLst/>
+          </a:prstGeom>
+        </p:spPr>
+        <p:txBody>
+          <a:bodyPr/>
+          <a:lstStyle/>
+          <a:p>
+            <a:fld id="{BBD74847-7BE4-4E4D-8159-51DF7B93C616}" type="slidenum">
+              <a:rPr lang="en-US" smtClean="0"/>
+              <a:t>‹#›</a:t>
+            </a:fld>
+            <a:endParaRPr lang="en-US"/>
+          </a:p>
+        </p:txBody>
+      </p:sp>
+      <p:cxnSp>
+        <p:nvCxnSpPr>
+          <p:cNvPr id="9" name="Straight Connector 8">
+            <a:extLst>
+              <a:ext uri="{FF2B5EF4-FFF2-40B4-BE49-F238E27FC236}">
+                <a16:creationId xmlns:a16="http://schemas.microsoft.com/office/drawing/2014/main" id="{72068E05-BA91-41C0-82CA-8F2AD35C67E8}"/>
+              </a:ext>
+            </a:extLst>
+          </p:cNvPr>
+          <p:cNvCxnSpPr/>
+          <p:nvPr userDrawn="1"/>
+        </p:nvCxnSpPr>
+        <p:spPr>
+          <a:xfrm>
+            <a:off x="175260" y="6316935"/>
+            <a:ext cx="8831580" cy="0"/>
+          </a:xfrm>
+          <a:prstGeom prst="line">
+            <a:avLst/>
+          </a:prstGeom>
+        </p:spPr>
+        <p:style>
+          <a:lnRef idx="1">
+            <a:schemeClr val="dk1"/>
+          </a:lnRef>
+          <a:fillRef idx="0">
+            <a:schemeClr val="dk1"/>
+          </a:fillRef>
+          <a:effectRef idx="0">
+            <a:schemeClr val="dk1"/>
+          </a:effectRef>
+          <a:fontRef idx="minor">
+            <a:schemeClr val="tx1"/>
+          </a:fontRef>
+        </p:style>
+      </p:cxnSp>
+      <p:sp>
+        <p:nvSpPr>
+          <p:cNvPr id="13" name="Rectangle 12">
+            <a:extLst>
+              <a:ext uri="{FF2B5EF4-FFF2-40B4-BE49-F238E27FC236}">
+                <a16:creationId xmlns:a16="http://schemas.microsoft.com/office/drawing/2014/main" id="{B2971BF8-D77B-4814-931D-48F5EB38C3C1}"/>
+              </a:ext>
+            </a:extLst>
+          </p:cNvPr>
+          <p:cNvSpPr>
+            <a:spLocks noChangeAspect="1"/>
+          </p:cNvSpPr>
+          <p:nvPr userDrawn="1"/>
+        </p:nvSpPr>
+        <p:spPr>
+          <a:xfrm>
+            <a:off x="142200" y="249101"/>
+            <a:ext cx="8831579" cy="840455"/>
+          </a:xfrm>
+          <a:prstGeom prst="rect">
+            <a:avLst/>
+          </a:prstGeom>
+          <a:solidFill>
+            <a:schemeClr val="accent1"/>
+          </a:solidFill>
+          <a:ln>
+            <a:noFill/>
+          </a:ln>
+          <a:effectLst/>
+        </p:spPr>
+        <p:style>
+          <a:lnRef idx="1">
+            <a:schemeClr val="accent1"/>
+          </a:lnRef>
+          <a:fillRef idx="3">
+            <a:schemeClr val="accent1"/>
+          </a:fillRef>
+          <a:effectRef idx="2">
+            <a:schemeClr val="accent1"/>
+          </a:effectRef>
+          <a:fontRef idx="minor">
+            <a:schemeClr val="lt1"/>
+          </a:fontRef>
+        </p:style>
+        <p:txBody>
+          <a:bodyPr/>
+          <a:lstStyle/>
+          <a:p>
+            <a:endParaRPr lang="en-US" dirty="0"/>
+          </a:p>
+        </p:txBody>
+      </p:sp>
+      <p:sp>
+        <p:nvSpPr>
+          <p:cNvPr id="14" name="Title 1">
+            <a:extLst>
+              <a:ext uri="{FF2B5EF4-FFF2-40B4-BE49-F238E27FC236}">
+                <a16:creationId xmlns:a16="http://schemas.microsoft.com/office/drawing/2014/main" id="{37D59584-71E8-443A-AF13-6C99AD60823A}"/>
+              </a:ext>
+            </a:extLst>
+          </p:cNvPr>
+          <p:cNvSpPr>
+            <a:spLocks noGrp="1"/>
+          </p:cNvSpPr>
+          <p:nvPr>
+            <p:ph type="title"/>
+          </p:nvPr>
+        </p:nvSpPr>
+        <p:spPr>
+          <a:xfrm>
+            <a:off x="175260" y="292975"/>
+            <a:ext cx="8746864" cy="752706"/>
+          </a:xfrm>
+        </p:spPr>
+        <p:txBody>
+          <a:bodyPr anchor="t"/>
+          <a:lstStyle>
+            <a:lvl1pPr>
+              <a:defRPr>
+                <a:solidFill>
+                  <a:schemeClr val="tx1"/>
+                </a:solidFill>
+              </a:defRPr>
+            </a:lvl1pPr>
+          </a:lstStyle>
+          <a:p>
+            <a:r>
+              <a:rPr lang="en-US" dirty="0"/>
+              <a:t>Click to edit Master title style</a:t>
+            </a:r>
+          </a:p>
+        </p:txBody>
+      </p:sp>
+    </p:spTree>
+    <p:extLst>
+      <p:ext uri="{BB962C8B-B14F-4D97-AF65-F5344CB8AC3E}">
+        <p14:creationId xmlns:p14="http://schemas.microsoft.com/office/powerpoint/2010/main" val="997795342"/>
+      </p:ext>
+    </p:extLst>
+  </p:cSld>
+  <p:clrMapOvr>
+    <a:masterClrMapping/>
+  </p:clrMapOvr>
+</p:sldLayout>
+</file>
+
+<file path=ppt/slideLayouts/slideLayout15.xml><?xml version="1.0" encoding="utf-8"?>
+<p:sldLayout xmlns:a="http://schemas.openxmlformats.org/drawingml/2006/main" xmlns:r="http://schemas.openxmlformats.org/officeDocument/2006/relationships" xmlns:p="http://schemas.openxmlformats.org/presentationml/2006/main" preserve="1" userDrawn="1">
+  <p:cSld name="1_Blank">
+    <p:spTree>
+      <p:nvGrpSpPr>
+        <p:cNvPr id="1" name=""/>
+        <p:cNvGrpSpPr/>
+        <p:nvPr/>
+      </p:nvGrpSpPr>
+      <p:grpSpPr>
+        <a:xfrm>
+          <a:off x="0" y="0"/>
+          <a:ext cx="0" cy="0"/>
+          <a:chOff x="0" y="0"/>
+          <a:chExt cx="0" cy="0"/>
+        </a:xfrm>
+      </p:grpSpPr>
+      <p:sp>
+        <p:nvSpPr>
+          <p:cNvPr id="8" name="Rectangle 7">
+            <a:extLst>
+              <a:ext uri="{FF2B5EF4-FFF2-40B4-BE49-F238E27FC236}">
+                <a16:creationId xmlns:a16="http://schemas.microsoft.com/office/drawing/2014/main" id="{8DE18750-3B08-429F-A276-D977DF7F7295}"/>
+              </a:ext>
+            </a:extLst>
+          </p:cNvPr>
+          <p:cNvSpPr>
+            <a:spLocks noChangeAspect="1"/>
+          </p:cNvSpPr>
+          <p:nvPr userDrawn="1"/>
+        </p:nvSpPr>
+        <p:spPr>
+          <a:xfrm>
+            <a:off x="142200" y="249101"/>
+            <a:ext cx="8831579" cy="840455"/>
+          </a:xfrm>
+          <a:prstGeom prst="rect">
+            <a:avLst/>
+          </a:prstGeom>
+          <a:solidFill>
+            <a:schemeClr val="accent1"/>
+          </a:solidFill>
+          <a:ln>
+            <a:noFill/>
+          </a:ln>
+          <a:effectLst/>
+        </p:spPr>
+        <p:style>
+          <a:lnRef idx="1">
+            <a:schemeClr val="accent1"/>
+          </a:lnRef>
+          <a:fillRef idx="3">
+            <a:schemeClr val="accent1"/>
+          </a:fillRef>
+          <a:effectRef idx="2">
+            <a:schemeClr val="accent1"/>
+          </a:effectRef>
+          <a:fontRef idx="minor">
+            <a:schemeClr val="lt1"/>
+          </a:fontRef>
+        </p:style>
+        <p:txBody>
+          <a:bodyPr/>
+          <a:lstStyle/>
+          <a:p>
+            <a:endParaRPr lang="en-US" dirty="0"/>
+          </a:p>
+        </p:txBody>
+      </p:sp>
+      <p:sp>
+        <p:nvSpPr>
+          <p:cNvPr id="9" name="Title 1">
+            <a:extLst>
+              <a:ext uri="{FF2B5EF4-FFF2-40B4-BE49-F238E27FC236}">
+                <a16:creationId xmlns:a16="http://schemas.microsoft.com/office/drawing/2014/main" id="{09B12976-4243-42C3-AD82-8647817437DB}"/>
+              </a:ext>
+            </a:extLst>
+          </p:cNvPr>
+          <p:cNvSpPr>
+            <a:spLocks noGrp="1"/>
+          </p:cNvSpPr>
+          <p:nvPr>
+            <p:ph type="title"/>
+          </p:nvPr>
+        </p:nvSpPr>
+        <p:spPr>
+          <a:xfrm>
+            <a:off x="175260" y="292975"/>
+            <a:ext cx="8746864" cy="752706"/>
+          </a:xfrm>
+        </p:spPr>
+        <p:txBody>
+          <a:bodyPr anchor="t"/>
+          <a:lstStyle>
+            <a:lvl1pPr>
+              <a:defRPr>
+                <a:solidFill>
+                  <a:schemeClr val="tx1"/>
+                </a:solidFill>
+              </a:defRPr>
+            </a:lvl1pPr>
+          </a:lstStyle>
+          <a:p>
+            <a:r>
+              <a:rPr lang="en-US" dirty="0"/>
+              <a:t>Click to edit Master title style</a:t>
+            </a:r>
+          </a:p>
+        </p:txBody>
+      </p:sp>
+      <p:sp>
+        <p:nvSpPr>
+          <p:cNvPr id="10" name="Slide Number Placeholder 5">
+            <a:extLst>
+              <a:ext uri="{FF2B5EF4-FFF2-40B4-BE49-F238E27FC236}">
+                <a16:creationId xmlns:a16="http://schemas.microsoft.com/office/drawing/2014/main" id="{AB5BF95A-3885-4491-876B-4C99D444A819}"/>
+              </a:ext>
+            </a:extLst>
+          </p:cNvPr>
+          <p:cNvSpPr>
+            <a:spLocks noGrp="1"/>
+          </p:cNvSpPr>
+          <p:nvPr>
+            <p:ph type="sldNum" sz="quarter" idx="12"/>
+          </p:nvPr>
+        </p:nvSpPr>
+        <p:spPr>
+          <a:xfrm>
+            <a:off x="8236372" y="6280641"/>
+            <a:ext cx="770468" cy="365125"/>
+          </a:xfrm>
+          <a:prstGeom prst="rect">
+            <a:avLst/>
+          </a:prstGeom>
+        </p:spPr>
+        <p:txBody>
+          <a:bodyPr/>
+          <a:lstStyle/>
+          <a:p>
+            <a:fld id="{BBD74847-7BE4-4E4D-8159-51DF7B93C616}" type="slidenum">
+              <a:rPr lang="en-US" smtClean="0"/>
+              <a:t>‹#›</a:t>
+            </a:fld>
+            <a:endParaRPr lang="en-US"/>
+          </a:p>
+        </p:txBody>
+      </p:sp>
+      <p:cxnSp>
+        <p:nvCxnSpPr>
+          <p:cNvPr id="11" name="Straight Connector 10">
+            <a:extLst>
+              <a:ext uri="{FF2B5EF4-FFF2-40B4-BE49-F238E27FC236}">
+                <a16:creationId xmlns:a16="http://schemas.microsoft.com/office/drawing/2014/main" id="{A625C0E0-87AD-4A9A-8CC2-D51E549C54AC}"/>
+              </a:ext>
+            </a:extLst>
+          </p:cNvPr>
+          <p:cNvCxnSpPr/>
+          <p:nvPr userDrawn="1"/>
+        </p:nvCxnSpPr>
+        <p:spPr>
+          <a:xfrm>
+            <a:off x="175260" y="6316935"/>
+            <a:ext cx="8831580" cy="0"/>
+          </a:xfrm>
+          <a:prstGeom prst="line">
+            <a:avLst/>
+          </a:prstGeom>
+        </p:spPr>
+        <p:style>
+          <a:lnRef idx="1">
+            <a:schemeClr val="dk1"/>
+          </a:lnRef>
+          <a:fillRef idx="0">
+            <a:schemeClr val="dk1"/>
+          </a:fillRef>
+          <a:effectRef idx="0">
+            <a:schemeClr val="dk1"/>
+          </a:effectRef>
+          <a:fontRef idx="minor">
+            <a:schemeClr val="tx1"/>
+          </a:fontRef>
+        </p:style>
+      </p:cxnSp>
+      <p:sp>
+        <p:nvSpPr>
+          <p:cNvPr id="12" name="Footer Placeholder 4">
+            <a:extLst>
+              <a:ext uri="{FF2B5EF4-FFF2-40B4-BE49-F238E27FC236}">
+                <a16:creationId xmlns:a16="http://schemas.microsoft.com/office/drawing/2014/main" id="{957F6DEB-B3FE-4632-A871-23BAA7FEADD1}"/>
+              </a:ext>
+            </a:extLst>
+          </p:cNvPr>
+          <p:cNvSpPr>
+            <a:spLocks noGrp="1"/>
+          </p:cNvSpPr>
+          <p:nvPr>
+            <p:ph type="ftr" sz="quarter" idx="11"/>
+          </p:nvPr>
+        </p:nvSpPr>
+        <p:spPr>
+          <a:xfrm>
+            <a:off x="88409" y="6266485"/>
+            <a:ext cx="4870585" cy="365125"/>
+          </a:xfrm>
+          <a:prstGeom prst="rect">
+            <a:avLst/>
+          </a:prstGeom>
+        </p:spPr>
+        <p:txBody>
+          <a:bodyPr/>
+          <a:lstStyle/>
+          <a:p>
+            <a:r>
+              <a:rPr lang="en-GB"/>
+              <a:t>Copyright © 2020 SPIKE Prime Lessons (primelessons.org) CC-BY-NC-SA.  (Last edit: 11/23/2020)</a:t>
+            </a:r>
+            <a:endParaRPr lang="en-US" dirty="0"/>
+          </a:p>
+        </p:txBody>
+      </p:sp>
+    </p:spTree>
+    <p:extLst>
+      <p:ext uri="{BB962C8B-B14F-4D97-AF65-F5344CB8AC3E}">
+        <p14:creationId xmlns:p14="http://schemas.microsoft.com/office/powerpoint/2010/main" val="2961518194"/>
+      </p:ext>
+    </p:extLst>
+  </p:cSld>
+  <p:clrMapOvr>
+    <a:masterClrMapping/>
+  </p:clrMapOvr>
+</p:sldLayout>
+</file>
+
+<file path=ppt/slideLayouts/slideLayout2.xml><?xml version="1.0" encoding="utf-8"?>
+<p:sldLayout xmlns:a="http://schemas.openxmlformats.org/drawingml/2006/main" xmlns:r="http://schemas.openxmlformats.org/officeDocument/2006/relationships" xmlns:p="http://schemas.openxmlformats.org/presentationml/2006/main" type="obj" preserve="1">
+  <p:cSld name="Title and Content">
+    <p:spTree>
+      <p:nvGrpSpPr>
+        <p:cNvPr id="1" name=""/>
+        <p:cNvGrpSpPr/>
+        <p:nvPr/>
+      </p:nvGrpSpPr>
+      <p:grpSpPr>
+        <a:xfrm>
+          <a:off x="0" y="0"/>
+          <a:ext cx="0" cy="0"/>
+          <a:chOff x="0" y="0"/>
+          <a:chExt cx="0" cy="0"/>
+        </a:xfrm>
+      </p:grpSpPr>
+      <p:sp>
+        <p:nvSpPr>
+          <p:cNvPr id="7" name="Rectangle 6"/>
+          <p:cNvSpPr>
+            <a:spLocks noChangeAspect="1"/>
+          </p:cNvSpPr>
+          <p:nvPr/>
+        </p:nvSpPr>
+        <p:spPr>
+          <a:xfrm>
+            <a:off x="142200" y="249101"/>
+            <a:ext cx="8831579" cy="840455"/>
+          </a:xfrm>
+          <a:prstGeom prst="rect">
+            <a:avLst/>
+          </a:prstGeom>
+          <a:solidFill>
+            <a:schemeClr val="accent1"/>
+          </a:solidFill>
+          <a:ln>
+            <a:noFill/>
+          </a:ln>
+          <a:effectLst/>
+        </p:spPr>
+        <p:style>
+          <a:lnRef idx="1">
+            <a:schemeClr val="accent1"/>
+          </a:lnRef>
+          <a:fillRef idx="3">
+            <a:schemeClr val="accent1"/>
+          </a:fillRef>
+          <a:effectRef idx="2">
+            <a:schemeClr val="accent1"/>
+          </a:effectRef>
+          <a:fontRef idx="minor">
+            <a:schemeClr val="lt1"/>
+          </a:fontRef>
+        </p:style>
+        <p:txBody>
+          <a:bodyPr/>
+          <a:lstStyle/>
+          <a:p>
+            <a:endParaRPr lang="en-US" dirty="0"/>
+          </a:p>
+        </p:txBody>
+      </p:sp>
+      <p:sp>
+        <p:nvSpPr>
+          <p:cNvPr id="2" name="Title 1"/>
+          <p:cNvSpPr>
+            <a:spLocks noGrp="1"/>
+          </p:cNvSpPr>
+          <p:nvPr>
+            <p:ph type="title"/>
+          </p:nvPr>
+        </p:nvSpPr>
+        <p:spPr>
+          <a:xfrm>
+            <a:off x="175260" y="292975"/>
+            <a:ext cx="8746864" cy="752706"/>
+          </a:xfrm>
+        </p:spPr>
+        <p:txBody>
+          <a:bodyPr anchor="t"/>
+          <a:lstStyle>
+            <a:lvl1pPr>
+              <a:defRPr>
+                <a:solidFill>
+                  <a:schemeClr val="tx1"/>
+                </a:solidFill>
+              </a:defRPr>
+            </a:lvl1pPr>
+          </a:lstStyle>
+          <a:p>
+            <a:r>
+              <a:rPr lang="en-US"/>
+              <a:t>Click to edit Master title style</a:t>
+            </a:r>
+            <a:endParaRPr lang="en-US" dirty="0"/>
+          </a:p>
+        </p:txBody>
+      </p:sp>
+      <p:sp>
+        <p:nvSpPr>
+          <p:cNvPr id="3" name="Content Placeholder 2"/>
+          <p:cNvSpPr>
+            <a:spLocks noGrp="1"/>
+          </p:cNvSpPr>
+          <p:nvPr>
+            <p:ph idx="1"/>
+          </p:nvPr>
+        </p:nvSpPr>
+        <p:spPr>
+          <a:xfrm>
+            <a:off x="155088" y="1140006"/>
+            <a:ext cx="8831580" cy="5082601"/>
+          </a:xfrm>
+        </p:spPr>
+        <p:txBody>
+          <a:bodyPr/>
+          <a:lstStyle/>
+          <a:p>
+            <a:pPr lvl="0"/>
+            <a:r>
+              <a:rPr lang="en-US"/>
+              <a:t>Click to edit Master text styles</a:t>
+            </a:r>
+          </a:p>
+          <a:p>
+            <a:pPr lvl="1"/>
+            <a:r>
+              <a:rPr lang="en-US"/>
+              <a:t>Second level</a:t>
+            </a:r>
+          </a:p>
+          <a:p>
+            <a:pPr lvl="2"/>
+            <a:r>
+              <a:rPr lang="en-US"/>
+              <a:t>Third level</a:t>
+            </a:r>
+          </a:p>
+          <a:p>
+            <a:pPr lvl="3"/>
+            <a:r>
+              <a:rPr lang="en-US"/>
+              <a:t>Fourth level</a:t>
+            </a:r>
+          </a:p>
+          <a:p>
+            <a:pPr lvl="4"/>
+            <a:r>
+              <a:rPr lang="en-US"/>
+              <a:t>Fifth level</a:t>
+            </a:r>
+            <a:endParaRPr lang="en-US" dirty="0"/>
+          </a:p>
+        </p:txBody>
+      </p:sp>
+      <p:sp>
+        <p:nvSpPr>
+          <p:cNvPr id="5" name="Footer Placeholder 4"/>
+          <p:cNvSpPr>
+            <a:spLocks noGrp="1"/>
+          </p:cNvSpPr>
+          <p:nvPr>
+            <p:ph type="ftr" sz="quarter" idx="11"/>
+          </p:nvPr>
+        </p:nvSpPr>
+        <p:spPr>
+          <a:xfrm>
+            <a:off x="88409" y="6320275"/>
+            <a:ext cx="4870585" cy="365125"/>
+          </a:xfrm>
+          <a:prstGeom prst="rect">
+            <a:avLst/>
+          </a:prstGeom>
+        </p:spPr>
+        <p:txBody>
+          <a:bodyPr/>
+          <a:lstStyle>
+            <a:lvl1pPr>
+              <a:defRPr sz="900"/>
+            </a:lvl1pPr>
+          </a:lstStyle>
+          <a:p>
+            <a:r>
+              <a:rPr lang="en-GB"/>
+              <a:t>Copyright © 2020 SPIKE Prime Lessons (primelessons.org) CC-BY-NC-SA.  (Last edit: 11/23/2020)</a:t>
+            </a:r>
+            <a:endParaRPr lang="en-US" dirty="0"/>
+          </a:p>
+        </p:txBody>
+      </p:sp>
+      <p:sp>
+        <p:nvSpPr>
+          <p:cNvPr id="6" name="Slide Number Placeholder 5"/>
+          <p:cNvSpPr>
+            <a:spLocks noGrp="1"/>
+          </p:cNvSpPr>
+          <p:nvPr>
+            <p:ph type="sldNum" sz="quarter" idx="12"/>
+          </p:nvPr>
+        </p:nvSpPr>
+        <p:spPr>
+          <a:xfrm>
+            <a:off x="8236372" y="6316501"/>
+            <a:ext cx="770468" cy="365125"/>
+          </a:xfrm>
+          <a:prstGeom prst="rect">
+            <a:avLst/>
+          </a:prstGeom>
+        </p:spPr>
+        <p:txBody>
+          <a:bodyPr/>
+          <a:lstStyle/>
+          <a:p>
+            <a:fld id="{BBD74847-7BE4-4E4D-8159-51DF7B93C616}" type="slidenum">
+              <a:rPr lang="en-US" smtClean="0"/>
+              <a:t>‹#›</a:t>
+            </a:fld>
+            <a:endParaRPr lang="en-US"/>
+          </a:p>
+        </p:txBody>
+      </p:sp>
+      <p:cxnSp>
+        <p:nvCxnSpPr>
+          <p:cNvPr id="9" name="Straight Connector 8">
+            <a:extLst>
+              <a:ext uri="{FF2B5EF4-FFF2-40B4-BE49-F238E27FC236}">
+                <a16:creationId xmlns:a16="http://schemas.microsoft.com/office/drawing/2014/main" id="{D59C872A-C57F-4B1F-AFD0-FDF125C3C485}"/>
+              </a:ext>
+            </a:extLst>
+          </p:cNvPr>
+          <p:cNvCxnSpPr/>
+          <p:nvPr/>
+        </p:nvCxnSpPr>
+        <p:spPr>
+          <a:xfrm>
+            <a:off x="175260" y="6316935"/>
+            <a:ext cx="8831580" cy="0"/>
+          </a:xfrm>
+          <a:prstGeom prst="line">
+            <a:avLst/>
+          </a:prstGeom>
+        </p:spPr>
+        <p:style>
+          <a:lnRef idx="1">
+            <a:schemeClr val="dk1"/>
+          </a:lnRef>
+          <a:fillRef idx="0">
+            <a:schemeClr val="dk1"/>
+          </a:fillRef>
+          <a:effectRef idx="0">
+            <a:schemeClr val="dk1"/>
+          </a:effectRef>
+          <a:fontRef idx="minor">
+            <a:schemeClr val="tx1"/>
+          </a:fontRef>
+        </p:style>
+      </p:cxnSp>
+      <p:cxnSp>
+        <p:nvCxnSpPr>
+          <p:cNvPr id="8" name="Straight Connector 7">
+            <a:extLst>
+              <a:ext uri="{FF2B5EF4-FFF2-40B4-BE49-F238E27FC236}">
+                <a16:creationId xmlns:a16="http://schemas.microsoft.com/office/drawing/2014/main" id="{3FE2A0B5-153B-894A-98D5-D16DC0CEFAC4}"/>
+              </a:ext>
+            </a:extLst>
+          </p:cNvPr>
+          <p:cNvCxnSpPr/>
+          <p:nvPr userDrawn="1"/>
+        </p:nvCxnSpPr>
+        <p:spPr>
+          <a:xfrm>
+            <a:off x="175260" y="6316935"/>
+            <a:ext cx="8831580" cy="0"/>
+          </a:xfrm>
+          <a:prstGeom prst="line">
+            <a:avLst/>
+          </a:prstGeom>
+        </p:spPr>
+        <p:style>
+          <a:lnRef idx="1">
+            <a:schemeClr val="dk1"/>
+          </a:lnRef>
+          <a:fillRef idx="0">
+            <a:schemeClr val="dk1"/>
+          </a:fillRef>
+          <a:effectRef idx="0">
+            <a:schemeClr val="dk1"/>
+          </a:effectRef>
+          <a:fontRef idx="minor">
+            <a:schemeClr val="tx1"/>
+          </a:fontRef>
+        </p:style>
+      </p:cxnSp>
+    </p:spTree>
+    <p:extLst>
+      <p:ext uri="{BB962C8B-B14F-4D97-AF65-F5344CB8AC3E}">
+        <p14:creationId xmlns:p14="http://schemas.microsoft.com/office/powerpoint/2010/main" val="1526144779"/>
+      </p:ext>
+    </p:extLst>
+  </p:cSld>
+  <p:clrMapOvr>
+    <a:masterClrMapping/>
+  </p:clrMapOvr>
+</p:sldLayout>
+</file>
+
+<file path=ppt/slideLayouts/slideLayout3.xml><?xml version="1.0" encoding="utf-8"?>
+<p:sldLayout xmlns:a="http://schemas.openxmlformats.org/drawingml/2006/main" xmlns:r="http://schemas.openxmlformats.org/officeDocument/2006/relationships" xmlns:p="http://schemas.openxmlformats.org/presentationml/2006/main" type="secHead" preserve="1">
+  <p:cSld name="Section Header">
+    <p:spTree>
+      <p:nvGrpSpPr>
+        <p:cNvPr id="1" name=""/>
+        <p:cNvGrpSpPr/>
+        <p:nvPr/>
+      </p:nvGrpSpPr>
+      <p:grpSpPr>
+        <a:xfrm>
+          <a:off x="0" y="0"/>
+          <a:ext cx="0" cy="0"/>
+          <a:chOff x="0" y="0"/>
+          <a:chExt cx="0" cy="0"/>
+        </a:xfrm>
+      </p:grpSpPr>
+      <p:sp>
+        <p:nvSpPr>
+          <p:cNvPr id="8" name="Rectangle 7"/>
+          <p:cNvSpPr>
+            <a:spLocks noChangeAspect="1"/>
+          </p:cNvSpPr>
+          <p:nvPr/>
+        </p:nvSpPr>
+        <p:spPr>
+          <a:xfrm>
+            <a:off x="452646" y="5141973"/>
+            <a:ext cx="8238707" cy="1258827"/>
+          </a:xfrm>
+          <a:prstGeom prst="rect">
+            <a:avLst/>
+          </a:prstGeom>
+          <a:solidFill>
+            <a:schemeClr val="accent1"/>
+          </a:solidFill>
+          <a:ln>
+            <a:noFill/>
+          </a:ln>
+          <a:effectLst/>
+        </p:spPr>
+        <p:style>
+          <a:lnRef idx="1">
+            <a:schemeClr val="accent1"/>
+          </a:lnRef>
+          <a:fillRef idx="3">
+            <a:schemeClr val="accent1"/>
+          </a:fillRef>
+          <a:effectRef idx="2">
+            <a:schemeClr val="accent1"/>
+          </a:effectRef>
+          <a:fontRef idx="minor">
+            <a:schemeClr val="lt1"/>
+          </a:fontRef>
+        </p:style>
+      </p:sp>
+      <p:sp>
+        <p:nvSpPr>
+          <p:cNvPr id="2" name="Title 1"/>
+          <p:cNvSpPr>
+            <a:spLocks noGrp="1"/>
+          </p:cNvSpPr>
+          <p:nvPr>
+            <p:ph type="title"/>
+          </p:nvPr>
+        </p:nvSpPr>
+        <p:spPr>
+          <a:xfrm>
+            <a:off x="581193" y="3036573"/>
+            <a:ext cx="7989751" cy="1504844"/>
+          </a:xfrm>
+        </p:spPr>
+        <p:txBody>
+          <a:bodyPr anchor="b">
+            <a:normAutofit/>
+          </a:bodyPr>
+          <a:lstStyle>
+            <a:lvl1pPr algn="l">
+              <a:defRPr sz="3600" b="0" cap="all">
+                <a:solidFill>
+                  <a:schemeClr val="accent1"/>
+                </a:solidFill>
+              </a:defRPr>
+            </a:lvl1pPr>
+          </a:lstStyle>
+          <a:p>
+            <a:r>
+              <a:rPr lang="en-US"/>
+              <a:t>Click to edit Master title style</a:t>
+            </a:r>
+            <a:endParaRPr lang="en-US" dirty="0"/>
+          </a:p>
+        </p:txBody>
+      </p:sp>
+      <p:sp>
+        <p:nvSpPr>
+          <p:cNvPr id="3" name="Text Placeholder 2"/>
+          <p:cNvSpPr>
+            <a:spLocks noGrp="1"/>
+          </p:cNvSpPr>
+          <p:nvPr>
+            <p:ph type="body" idx="1"/>
+          </p:nvPr>
+        </p:nvSpPr>
+        <p:spPr>
+          <a:xfrm>
+            <a:off x="581193" y="4541417"/>
+            <a:ext cx="7989751" cy="600556"/>
+          </a:xfrm>
+        </p:spPr>
+        <p:txBody>
+          <a:bodyPr anchor="t">
+            <a:normAutofit/>
+          </a:bodyPr>
+          <a:lstStyle>
+            <a:lvl1pPr marL="0" indent="0" algn="l">
+              <a:buNone/>
+              <a:defRPr sz="1800" cap="all">
+                <a:solidFill>
+                  <a:schemeClr val="accent2"/>
+                </a:solidFill>
+              </a:defRPr>
+            </a:lvl1pPr>
+            <a:lvl2pPr marL="457200" indent="0">
+              <a:buNone/>
+              <a:defRPr sz="1800">
+                <a:solidFill>
+                  <a:schemeClr val="tx1">
+                    <a:tint val="75000"/>
+                  </a:schemeClr>
+                </a:solidFill>
+              </a:defRPr>
+            </a:lvl2pPr>
+            <a:lvl3pPr marL="914400" indent="0">
+              <a:buNone/>
+              <a:defRPr sz="1600">
+                <a:solidFill>
+                  <a:schemeClr val="tx1">
+                    <a:tint val="75000"/>
+                  </a:schemeClr>
+                </a:solidFill>
+              </a:defRPr>
+            </a:lvl3pPr>
+            <a:lvl4pPr marL="1371600" indent="0">
+              <a:buNone/>
+              <a:defRPr sz="1400">
+                <a:solidFill>
+                  <a:schemeClr val="tx1">
+                    <a:tint val="75000"/>
+                  </a:schemeClr>
+                </a:solidFill>
+              </a:defRPr>
+            </a:lvl4pPr>
+            <a:lvl5pPr marL="1828800" indent="0">
+              <a:buNone/>
+              <a:defRPr sz="1400">
+                <a:solidFill>
+                  <a:schemeClr val="tx1">
+                    <a:tint val="75000"/>
+                  </a:schemeClr>
+                </a:solidFill>
+              </a:defRPr>
+            </a:lvl5pPr>
+            <a:lvl6pPr marL="2286000" indent="0">
+              <a:buNone/>
+              <a:defRPr sz="1400">
+                <a:solidFill>
+                  <a:schemeClr val="tx1">
+                    <a:tint val="75000"/>
+                  </a:schemeClr>
+                </a:solidFill>
+              </a:defRPr>
+            </a:lvl6pPr>
+            <a:lvl7pPr marL="2743200" indent="0">
+              <a:buNone/>
+              <a:defRPr sz="1400">
+                <a:solidFill>
+                  <a:schemeClr val="tx1">
+                    <a:tint val="75000"/>
+                  </a:schemeClr>
+                </a:solidFill>
+              </a:defRPr>
+            </a:lvl7pPr>
+            <a:lvl8pPr marL="3200400" indent="0">
+              <a:buNone/>
+              <a:defRPr sz="1400">
+                <a:solidFill>
+                  <a:schemeClr val="tx1">
+                    <a:tint val="75000"/>
+                  </a:schemeClr>
+                </a:solidFill>
+              </a:defRPr>
+            </a:lvl8pPr>
+            <a:lvl9pPr marL="3657600" indent="0">
+              <a:buNone/>
+              <a:defRPr sz="1400">
+                <a:solidFill>
+                  <a:schemeClr val="tx1">
+                    <a:tint val="75000"/>
+                  </a:schemeClr>
+                </a:solidFill>
+              </a:defRPr>
+            </a:lvl9pPr>
+          </a:lstStyle>
+          <a:p>
+            <a:pPr lvl="0"/>
+            <a:r>
+              <a:rPr lang="en-US"/>
+              <a:t>Click to edit Master text styles</a:t>
+            </a:r>
+          </a:p>
+        </p:txBody>
+      </p:sp>
+      <p:sp>
+        <p:nvSpPr>
+          <p:cNvPr id="4" name="Date Placeholder 3"/>
+          <p:cNvSpPr>
+            <a:spLocks noGrp="1"/>
+          </p:cNvSpPr>
+          <p:nvPr>
+            <p:ph type="dt" sz="half" idx="10"/>
+          </p:nvPr>
+        </p:nvSpPr>
+        <p:spPr>
+          <a:xfrm>
+            <a:off x="5559327" y="5956136"/>
+            <a:ext cx="2133600" cy="365125"/>
+          </a:xfrm>
+          <a:prstGeom prst="rect">
+            <a:avLst/>
+          </a:prstGeom>
+        </p:spPr>
+        <p:txBody>
+          <a:bodyPr/>
+          <a:lstStyle>
+            <a:lvl1pPr>
+              <a:defRPr>
+                <a:solidFill>
+                  <a:schemeClr val="accent1">
+                    <a:lumMod val="75000"/>
+                    <a:lumOff val="25000"/>
+                  </a:schemeClr>
+                </a:solidFill>
+              </a:defRPr>
+            </a:lvl1pPr>
+          </a:lstStyle>
+          <a:p>
+            <a:endParaRPr lang="en-US"/>
+          </a:p>
+        </p:txBody>
+      </p:sp>
+      <p:sp>
+        <p:nvSpPr>
+          <p:cNvPr id="5" name="Footer Placeholder 4"/>
+          <p:cNvSpPr>
+            <a:spLocks noGrp="1"/>
+          </p:cNvSpPr>
+          <p:nvPr>
+            <p:ph type="ftr" sz="quarter" idx="11"/>
+          </p:nvPr>
+        </p:nvSpPr>
+        <p:spPr>
+          <a:xfrm>
+            <a:off x="581192" y="5951810"/>
+            <a:ext cx="4870585" cy="365125"/>
+          </a:xfrm>
+          <a:prstGeom prst="rect">
+            <a:avLst/>
+          </a:prstGeom>
+        </p:spPr>
+        <p:txBody>
+          <a:bodyPr/>
+          <a:lstStyle>
+            <a:lvl1pPr>
+              <a:defRPr>
+                <a:solidFill>
+                  <a:schemeClr val="accent1">
+                    <a:lumMod val="75000"/>
+                    <a:lumOff val="25000"/>
+                  </a:schemeClr>
+                </a:solidFill>
+              </a:defRPr>
+            </a:lvl1pPr>
+          </a:lstStyle>
+          <a:p>
+            <a:r>
+              <a:rPr lang="en-GB"/>
+              <a:t>Copyright © 2020 SPIKE Prime Lessons (primelessons.org) CC-BY-NC-SA.  (Last edit: 11/23/2020)</a:t>
+            </a:r>
+            <a:endParaRPr lang="en-US" dirty="0"/>
+          </a:p>
+        </p:txBody>
+      </p:sp>
+      <p:sp>
+        <p:nvSpPr>
+          <p:cNvPr id="6" name="Slide Number Placeholder 5"/>
+          <p:cNvSpPr>
+            <a:spLocks noGrp="1"/>
+          </p:cNvSpPr>
+          <p:nvPr>
+            <p:ph type="sldNum" sz="quarter" idx="12"/>
+          </p:nvPr>
+        </p:nvSpPr>
+        <p:spPr>
+          <a:xfrm>
+            <a:off x="7800476" y="5956136"/>
+            <a:ext cx="770468" cy="365125"/>
+          </a:xfrm>
+          <a:prstGeom prst="rect">
+            <a:avLst/>
+          </a:prstGeom>
+        </p:spPr>
+        <p:txBody>
+          <a:bodyPr/>
+          <a:lstStyle>
+            <a:lvl1pPr>
+              <a:defRPr>
+                <a:solidFill>
+                  <a:schemeClr val="accent1">
+                    <a:lumMod val="75000"/>
+                    <a:lumOff val="25000"/>
+                  </a:schemeClr>
+                </a:solidFill>
+              </a:defRPr>
+            </a:lvl1pPr>
+          </a:lstStyle>
+          <a:p>
+            <a:fld id="{BBD74847-7BE4-4E4D-8159-51DF7B93C616}" type="slidenum">
+              <a:rPr lang="en-US" smtClean="0"/>
+              <a:t>‹#›</a:t>
+            </a:fld>
+            <a:endParaRPr lang="en-US"/>
+          </a:p>
+        </p:txBody>
+      </p:sp>
+      <p:sp>
+        <p:nvSpPr>
+          <p:cNvPr id="11" name="Rectangle 10">
+            <a:extLst>
+              <a:ext uri="{FF2B5EF4-FFF2-40B4-BE49-F238E27FC236}">
+                <a16:creationId xmlns:a16="http://schemas.microsoft.com/office/drawing/2014/main" id="{A9F621E0-AEE7-4799-81EB-EB99ED60C8DF}"/>
+              </a:ext>
+            </a:extLst>
+          </p:cNvPr>
+          <p:cNvSpPr>
+            <a:spLocks noChangeAspect="1"/>
+          </p:cNvSpPr>
+          <p:nvPr/>
+        </p:nvSpPr>
+        <p:spPr>
+          <a:xfrm>
+            <a:off x="142200" y="249101"/>
+            <a:ext cx="8831579" cy="840455"/>
+          </a:xfrm>
+          <a:prstGeom prst="rect">
+            <a:avLst/>
+          </a:prstGeom>
+          <a:solidFill>
+            <a:schemeClr val="accent1"/>
+          </a:solidFill>
+          <a:ln>
+            <a:noFill/>
+          </a:ln>
+          <a:effectLst/>
+        </p:spPr>
+        <p:style>
+          <a:lnRef idx="1">
+            <a:schemeClr val="accent1"/>
+          </a:lnRef>
+          <a:fillRef idx="3">
+            <a:schemeClr val="accent1"/>
+          </a:fillRef>
+          <a:effectRef idx="2">
+            <a:schemeClr val="accent1"/>
+          </a:effectRef>
+          <a:fontRef idx="minor">
+            <a:schemeClr val="lt1"/>
+          </a:fontRef>
+        </p:style>
+        <p:txBody>
+          <a:bodyPr/>
+          <a:lstStyle/>
+          <a:p>
+            <a:endParaRPr lang="en-US" dirty="0"/>
+          </a:p>
+        </p:txBody>
+      </p:sp>
+      <p:sp>
+        <p:nvSpPr>
+          <p:cNvPr id="12" name="Title 1">
+            <a:extLst>
+              <a:ext uri="{FF2B5EF4-FFF2-40B4-BE49-F238E27FC236}">
+                <a16:creationId xmlns:a16="http://schemas.microsoft.com/office/drawing/2014/main" id="{B40FAB25-E17C-4189-8846-137BC28A1EB3}"/>
+              </a:ext>
+            </a:extLst>
+          </p:cNvPr>
+          <p:cNvSpPr txBox="1">
+            <a:spLocks/>
+          </p:cNvSpPr>
+          <p:nvPr/>
+        </p:nvSpPr>
+        <p:spPr>
+          <a:xfrm>
+            <a:off x="175260" y="292975"/>
+            <a:ext cx="8746864" cy="752706"/>
+          </a:xfrm>
+          <a:prstGeom prst="rect">
+            <a:avLst/>
+          </a:prstGeom>
+        </p:spPr>
+        <p:txBody>
+          <a:bodyPr vert="horz" lIns="91440" tIns="45720" rIns="91440" bIns="45720" rtlCol="0" anchor="t">
+            <a:normAutofit/>
+          </a:bodyPr>
+          <a:lstStyle>
+            <a:lvl1pPr algn="l" defTabSz="457200" rtl="0" eaLnBrk="1" latinLnBrk="0" hangingPunct="1">
+              <a:spcBef>
+                <a:spcPct val="0"/>
+              </a:spcBef>
+              <a:buNone/>
+              <a:defRPr sz="2800" b="0" kern="1200" cap="all">
+                <a:solidFill>
+                  <a:schemeClr val="tx1"/>
+                </a:solidFill>
+                <a:latin typeface="+mj-lt"/>
+                <a:ea typeface="+mj-ea"/>
+                <a:cs typeface="+mj-cs"/>
+              </a:defRPr>
+            </a:lvl1pPr>
+            <a:lvl2pPr eaLnBrk="1" hangingPunct="1">
+              <a:defRPr>
+                <a:solidFill>
+                  <a:schemeClr val="tx2"/>
+                </a:solidFill>
+              </a:defRPr>
+            </a:lvl2pPr>
+            <a:lvl3pPr eaLnBrk="1" hangingPunct="1">
+              <a:defRPr>
+                <a:solidFill>
+                  <a:schemeClr val="tx2"/>
+                </a:solidFill>
+              </a:defRPr>
+            </a:lvl3pPr>
+            <a:lvl4pPr eaLnBrk="1" hangingPunct="1">
+              <a:defRPr>
+                <a:solidFill>
+                  <a:schemeClr val="tx2"/>
+                </a:solidFill>
+              </a:defRPr>
+            </a:lvl4pPr>
+            <a:lvl5pPr eaLnBrk="1" hangingPunct="1">
+              <a:defRPr>
+                <a:solidFill>
+                  <a:schemeClr val="tx2"/>
+                </a:solidFill>
+              </a:defRPr>
+            </a:lvl5pPr>
+            <a:lvl6pPr eaLnBrk="1" hangingPunct="1">
+              <a:defRPr>
+                <a:solidFill>
+                  <a:schemeClr val="tx2"/>
+                </a:solidFill>
+              </a:defRPr>
+            </a:lvl6pPr>
+            <a:lvl7pPr eaLnBrk="1" hangingPunct="1">
+              <a:defRPr>
+                <a:solidFill>
+                  <a:schemeClr val="tx2"/>
+                </a:solidFill>
+              </a:defRPr>
+            </a:lvl7pPr>
+            <a:lvl8pPr eaLnBrk="1" hangingPunct="1">
+              <a:defRPr>
+                <a:solidFill>
+                  <a:schemeClr val="tx2"/>
+                </a:solidFill>
+              </a:defRPr>
+            </a:lvl8pPr>
+            <a:lvl9pPr eaLnBrk="1" hangingPunct="1">
+              <a:defRPr>
+                <a:solidFill>
+                  <a:schemeClr val="tx2"/>
+                </a:solidFill>
+              </a:defRPr>
+            </a:lvl9pPr>
+          </a:lstStyle>
+          <a:p>
+            <a:r>
+              <a:rPr lang="en-US"/>
+              <a:t>Click to edit Master title style</a:t>
+            </a:r>
+            <a:endParaRPr lang="en-US" dirty="0"/>
+          </a:p>
+        </p:txBody>
+      </p:sp>
+      <p:sp>
+        <p:nvSpPr>
+          <p:cNvPr id="10" name="Rectangle 9">
+            <a:extLst>
+              <a:ext uri="{FF2B5EF4-FFF2-40B4-BE49-F238E27FC236}">
+                <a16:creationId xmlns:a16="http://schemas.microsoft.com/office/drawing/2014/main" id="{7C55705A-E337-FC4F-82CF-FEEBC57F7721}"/>
+              </a:ext>
+            </a:extLst>
+          </p:cNvPr>
+          <p:cNvSpPr>
+            <a:spLocks noChangeAspect="1"/>
+          </p:cNvSpPr>
+          <p:nvPr userDrawn="1"/>
+        </p:nvSpPr>
+        <p:spPr>
+          <a:xfrm>
+            <a:off x="142200" y="249101"/>
+            <a:ext cx="8831579" cy="840455"/>
+          </a:xfrm>
+          <a:prstGeom prst="rect">
+            <a:avLst/>
+          </a:prstGeom>
+          <a:solidFill>
+            <a:schemeClr val="accent1"/>
+          </a:solidFill>
+          <a:ln>
+            <a:noFill/>
+          </a:ln>
+          <a:effectLst/>
+        </p:spPr>
+        <p:style>
+          <a:lnRef idx="1">
+            <a:schemeClr val="accent1"/>
+          </a:lnRef>
+          <a:fillRef idx="3">
+            <a:schemeClr val="accent1"/>
+          </a:fillRef>
+          <a:effectRef idx="2">
+            <a:schemeClr val="accent1"/>
+          </a:effectRef>
+          <a:fontRef idx="minor">
+            <a:schemeClr val="lt1"/>
+          </a:fontRef>
+        </p:style>
+        <p:txBody>
+          <a:bodyPr/>
+          <a:lstStyle/>
+          <a:p>
+            <a:endParaRPr lang="en-US" dirty="0"/>
+          </a:p>
+        </p:txBody>
+      </p:sp>
+      <p:sp>
+        <p:nvSpPr>
+          <p:cNvPr id="13" name="Title 1">
+            <a:extLst>
+              <a:ext uri="{FF2B5EF4-FFF2-40B4-BE49-F238E27FC236}">
+                <a16:creationId xmlns:a16="http://schemas.microsoft.com/office/drawing/2014/main" id="{6D04B386-D953-FC45-97CA-E5338F029806}"/>
+              </a:ext>
+            </a:extLst>
+          </p:cNvPr>
+          <p:cNvSpPr txBox="1">
+            <a:spLocks/>
+          </p:cNvSpPr>
+          <p:nvPr userDrawn="1"/>
+        </p:nvSpPr>
+        <p:spPr>
+          <a:xfrm>
+            <a:off x="175260" y="292975"/>
+            <a:ext cx="8746864" cy="752706"/>
+          </a:xfrm>
+          <a:prstGeom prst="rect">
+            <a:avLst/>
+          </a:prstGeom>
+        </p:spPr>
+        <p:txBody>
+          <a:bodyPr vert="horz" lIns="91440" tIns="45720" rIns="91440" bIns="45720" rtlCol="0" anchor="t">
+            <a:normAutofit/>
+          </a:bodyPr>
+          <a:lstStyle>
+            <a:lvl1pPr algn="l" defTabSz="457200" rtl="0" eaLnBrk="1" latinLnBrk="0" hangingPunct="1">
+              <a:spcBef>
+                <a:spcPct val="0"/>
+              </a:spcBef>
+              <a:buNone/>
+              <a:defRPr sz="2800" b="0" kern="1200" cap="all">
+                <a:solidFill>
+                  <a:schemeClr val="tx1"/>
+                </a:solidFill>
+                <a:latin typeface="+mj-lt"/>
+                <a:ea typeface="+mj-ea"/>
+                <a:cs typeface="+mj-cs"/>
+              </a:defRPr>
+            </a:lvl1pPr>
+            <a:lvl2pPr eaLnBrk="1" hangingPunct="1">
+              <a:defRPr>
+                <a:solidFill>
+                  <a:schemeClr val="tx2"/>
+                </a:solidFill>
+              </a:defRPr>
+            </a:lvl2pPr>
+            <a:lvl3pPr eaLnBrk="1" hangingPunct="1">
+              <a:defRPr>
+                <a:solidFill>
+                  <a:schemeClr val="tx2"/>
+                </a:solidFill>
+              </a:defRPr>
+            </a:lvl3pPr>
+            <a:lvl4pPr eaLnBrk="1" hangingPunct="1">
+              <a:defRPr>
+                <a:solidFill>
+                  <a:schemeClr val="tx2"/>
+                </a:solidFill>
+              </a:defRPr>
+            </a:lvl4pPr>
+            <a:lvl5pPr eaLnBrk="1" hangingPunct="1">
+              <a:defRPr>
+                <a:solidFill>
+                  <a:schemeClr val="tx2"/>
+                </a:solidFill>
+              </a:defRPr>
+            </a:lvl5pPr>
+            <a:lvl6pPr eaLnBrk="1" hangingPunct="1">
+              <a:defRPr>
+                <a:solidFill>
+                  <a:schemeClr val="tx2"/>
+                </a:solidFill>
+              </a:defRPr>
+            </a:lvl6pPr>
+            <a:lvl7pPr eaLnBrk="1" hangingPunct="1">
+              <a:defRPr>
+                <a:solidFill>
+                  <a:schemeClr val="tx2"/>
+                </a:solidFill>
+              </a:defRPr>
+            </a:lvl7pPr>
+            <a:lvl8pPr eaLnBrk="1" hangingPunct="1">
+              <a:defRPr>
+                <a:solidFill>
+                  <a:schemeClr val="tx2"/>
+                </a:solidFill>
+              </a:defRPr>
+            </a:lvl8pPr>
+            <a:lvl9pPr eaLnBrk="1" hangingPunct="1">
+              <a:defRPr>
+                <a:solidFill>
+                  <a:schemeClr val="tx2"/>
+                </a:solidFill>
+              </a:defRPr>
+            </a:lvl9pPr>
+          </a:lstStyle>
+          <a:p>
+            <a:r>
+              <a:rPr lang="en-US"/>
+              <a:t>Click to edit Master title style</a:t>
+            </a:r>
+            <a:endParaRPr lang="en-US" dirty="0"/>
+          </a:p>
+        </p:txBody>
+      </p:sp>
+    </p:spTree>
+    <p:extLst>
+      <p:ext uri="{BB962C8B-B14F-4D97-AF65-F5344CB8AC3E}">
+        <p14:creationId xmlns:p14="http://schemas.microsoft.com/office/powerpoint/2010/main" val="432654021"/>
+      </p:ext>
+    </p:extLst>
+  </p:cSld>
+  <p:clrMapOvr>
+    <a:masterClrMapping/>
+  </p:clrMapOvr>
+</p:sldLayout>
+</file>
+
+<file path=ppt/slideLayouts/slideLayout4.xml><?xml version="1.0" encoding="utf-8"?>
+<p:sldLayout xmlns:a="http://schemas.openxmlformats.org/drawingml/2006/main" xmlns:r="http://schemas.openxmlformats.org/officeDocument/2006/relationships" xmlns:p="http://schemas.openxmlformats.org/presentationml/2006/main" preserve="1">
+  <p:cSld name="Two Content">
+    <p:spTree>
+      <p:nvGrpSpPr>
+        <p:cNvPr id="1" name=""/>
+        <p:cNvGrpSpPr/>
+        <p:nvPr/>
+      </p:nvGrpSpPr>
+      <p:grpSpPr>
+        <a:xfrm>
+          <a:off x="0" y="0"/>
+          <a:ext cx="0" cy="0"/>
+          <a:chOff x="0" y="0"/>
+          <a:chExt cx="0" cy="0"/>
+        </a:xfrm>
+      </p:grpSpPr>
+      <p:sp>
+        <p:nvSpPr>
+          <p:cNvPr id="3" name="Content Placeholder 2"/>
+          <p:cNvSpPr>
+            <a:spLocks noGrp="1"/>
+          </p:cNvSpPr>
+          <p:nvPr>
+            <p:ph sz="half" idx="1"/>
+          </p:nvPr>
+        </p:nvSpPr>
+        <p:spPr>
+          <a:xfrm>
+            <a:off x="142200" y="1174924"/>
+            <a:ext cx="4185204" cy="4967864"/>
+          </a:xfrm>
+        </p:spPr>
+        <p:txBody>
+          <a:bodyPr>
+            <a:normAutofit/>
+          </a:bodyPr>
+          <a:lstStyle>
+            <a:lvl1pPr algn="l">
+              <a:defRPr/>
+            </a:lvl1pPr>
+            <a:lvl2pPr algn="l">
+              <a:defRPr/>
+            </a:lvl2pPr>
+            <a:lvl3pPr algn="l">
+              <a:defRPr/>
+            </a:lvl3pPr>
+            <a:lvl4pPr algn="l">
+              <a:defRPr/>
+            </a:lvl4pPr>
+            <a:lvl5pPr algn="l">
+              <a:defRPr/>
+            </a:lvl5pPr>
+          </a:lstStyle>
+          <a:p>
+            <a:pPr lvl="0"/>
+            <a:r>
+              <a:rPr lang="en-US"/>
+              <a:t>Click to edit Master text styles</a:t>
+            </a:r>
+          </a:p>
+          <a:p>
+            <a:pPr lvl="1"/>
+            <a:r>
+              <a:rPr lang="en-US"/>
+              <a:t>Second level</a:t>
+            </a:r>
+          </a:p>
+          <a:p>
+            <a:pPr lvl="2"/>
+            <a:r>
+              <a:rPr lang="en-US"/>
+              <a:t>Third level</a:t>
+            </a:r>
+          </a:p>
+          <a:p>
+            <a:pPr lvl="3"/>
+            <a:r>
+              <a:rPr lang="en-US"/>
+              <a:t>Fourth level</a:t>
+            </a:r>
+          </a:p>
+          <a:p>
+            <a:pPr lvl="4"/>
+            <a:r>
+              <a:rPr lang="en-US"/>
+              <a:t>Fifth level</a:t>
+            </a:r>
+            <a:endParaRPr lang="en-US" dirty="0"/>
+          </a:p>
+        </p:txBody>
+      </p:sp>
+      <p:sp>
+        <p:nvSpPr>
+          <p:cNvPr id="4" name="Content Placeholder 3"/>
+          <p:cNvSpPr>
+            <a:spLocks noGrp="1"/>
+          </p:cNvSpPr>
+          <p:nvPr>
+            <p:ph sz="half" idx="2"/>
+          </p:nvPr>
+        </p:nvSpPr>
+        <p:spPr>
+          <a:xfrm>
+            <a:off x="4757752" y="1177439"/>
+            <a:ext cx="4226411" cy="4967864"/>
+          </a:xfrm>
+        </p:spPr>
+        <p:txBody>
+          <a:bodyPr>
+            <a:normAutofit/>
+          </a:bodyPr>
+          <a:lstStyle>
+            <a:lvl1pPr algn="l">
+              <a:defRPr/>
+            </a:lvl1pPr>
+            <a:lvl2pPr algn="l">
+              <a:defRPr/>
+            </a:lvl2pPr>
+            <a:lvl3pPr algn="l">
+              <a:defRPr/>
+            </a:lvl3pPr>
+            <a:lvl4pPr algn="l">
+              <a:defRPr/>
+            </a:lvl4pPr>
+            <a:lvl5pPr algn="l">
+              <a:defRPr/>
+            </a:lvl5pPr>
+          </a:lstStyle>
+          <a:p>
+            <a:pPr lvl="0"/>
+            <a:r>
+              <a:rPr lang="en-US"/>
+              <a:t>Click to edit Master text styles</a:t>
+            </a:r>
+          </a:p>
+          <a:p>
+            <a:pPr lvl="1"/>
+            <a:r>
+              <a:rPr lang="en-US"/>
+              <a:t>Second level</a:t>
+            </a:r>
+          </a:p>
+          <a:p>
+            <a:pPr lvl="2"/>
+            <a:r>
+              <a:rPr lang="en-US"/>
+              <a:t>Third level</a:t>
+            </a:r>
+          </a:p>
+          <a:p>
+            <a:pPr lvl="3"/>
+            <a:r>
+              <a:rPr lang="en-US"/>
+              <a:t>Fourth level</a:t>
+            </a:r>
+          </a:p>
+          <a:p>
+            <a:pPr lvl="4"/>
+            <a:r>
+              <a:rPr lang="en-US"/>
+              <a:t>Fifth level</a:t>
+            </a:r>
+            <a:endParaRPr lang="en-US" dirty="0"/>
+          </a:p>
+        </p:txBody>
+      </p:sp>
+      <p:sp>
+        <p:nvSpPr>
+          <p:cNvPr id="9" name="Footer Placeholder 4">
+            <a:extLst>
+              <a:ext uri="{FF2B5EF4-FFF2-40B4-BE49-F238E27FC236}">
+                <a16:creationId xmlns:a16="http://schemas.microsoft.com/office/drawing/2014/main" id="{593A4B09-24AC-454E-8A0C-D31EDE125503}"/>
+              </a:ext>
+            </a:extLst>
+          </p:cNvPr>
+          <p:cNvSpPr>
+            <a:spLocks noGrp="1"/>
+          </p:cNvSpPr>
+          <p:nvPr>
+            <p:ph type="ftr" sz="quarter" idx="11"/>
+          </p:nvPr>
+        </p:nvSpPr>
+        <p:spPr>
+          <a:xfrm>
+            <a:off x="88409" y="6266485"/>
+            <a:ext cx="4870585" cy="365125"/>
+          </a:xfrm>
+          <a:prstGeom prst="rect">
+            <a:avLst/>
+          </a:prstGeom>
+        </p:spPr>
+        <p:txBody>
+          <a:bodyPr/>
+          <a:lstStyle/>
+          <a:p>
+            <a:r>
+              <a:rPr lang="en-GB"/>
+              <a:t>Copyright © 2020 SPIKE Prime Lessons (primelessons.org) CC-BY-NC-SA.  (Last edit: 11/23/2020)</a:t>
+            </a:r>
+            <a:endParaRPr lang="en-US" dirty="0"/>
+          </a:p>
+        </p:txBody>
+      </p:sp>
+      <p:sp>
+        <p:nvSpPr>
+          <p:cNvPr id="10" name="Slide Number Placeholder 5">
+            <a:extLst>
+              <a:ext uri="{FF2B5EF4-FFF2-40B4-BE49-F238E27FC236}">
+                <a16:creationId xmlns:a16="http://schemas.microsoft.com/office/drawing/2014/main" id="{24EC4D01-901A-4258-A65D-27A4329F0F2D}"/>
+              </a:ext>
+            </a:extLst>
+          </p:cNvPr>
+          <p:cNvSpPr>
+            <a:spLocks noGrp="1"/>
+          </p:cNvSpPr>
+          <p:nvPr>
+            <p:ph type="sldNum" sz="quarter" idx="12"/>
+          </p:nvPr>
+        </p:nvSpPr>
+        <p:spPr>
+          <a:xfrm>
+            <a:off x="8236372" y="6280641"/>
+            <a:ext cx="770468" cy="365125"/>
+          </a:xfrm>
+          <a:prstGeom prst="rect">
+            <a:avLst/>
+          </a:prstGeom>
+        </p:spPr>
+        <p:txBody>
+          <a:bodyPr/>
+          <a:lstStyle/>
+          <a:p>
+            <a:fld id="{BBD74847-7BE4-4E4D-8159-51DF7B93C616}" type="slidenum">
+              <a:rPr lang="en-US" smtClean="0"/>
+              <a:t>‹#›</a:t>
+            </a:fld>
+            <a:endParaRPr lang="en-US"/>
+          </a:p>
+        </p:txBody>
+      </p:sp>
+      <p:cxnSp>
+        <p:nvCxnSpPr>
+          <p:cNvPr id="11" name="Straight Connector 10">
+            <a:extLst>
+              <a:ext uri="{FF2B5EF4-FFF2-40B4-BE49-F238E27FC236}">
+                <a16:creationId xmlns:a16="http://schemas.microsoft.com/office/drawing/2014/main" id="{BE3A7F9C-E99E-44C1-89A0-A6ED28ADCEF0}"/>
+              </a:ext>
+            </a:extLst>
+          </p:cNvPr>
+          <p:cNvCxnSpPr/>
+          <p:nvPr/>
+        </p:nvCxnSpPr>
+        <p:spPr>
+          <a:xfrm>
+            <a:off x="175260" y="6316935"/>
+            <a:ext cx="8831580" cy="0"/>
+          </a:xfrm>
+          <a:prstGeom prst="line">
+            <a:avLst/>
+          </a:prstGeom>
+        </p:spPr>
+        <p:style>
+          <a:lnRef idx="1">
+            <a:schemeClr val="dk1"/>
+          </a:lnRef>
+          <a:fillRef idx="0">
+            <a:schemeClr val="dk1"/>
+          </a:fillRef>
+          <a:effectRef idx="0">
+            <a:schemeClr val="dk1"/>
+          </a:effectRef>
+          <a:fontRef idx="minor">
+            <a:schemeClr val="tx1"/>
+          </a:fontRef>
+        </p:style>
+      </p:cxnSp>
+      <p:sp>
+        <p:nvSpPr>
+          <p:cNvPr id="15" name="Rectangle 14">
+            <a:extLst>
+              <a:ext uri="{FF2B5EF4-FFF2-40B4-BE49-F238E27FC236}">
+                <a16:creationId xmlns:a16="http://schemas.microsoft.com/office/drawing/2014/main" id="{8F86C8F5-3CD8-41C6-A6C4-EF53AE7214CB}"/>
+              </a:ext>
+            </a:extLst>
+          </p:cNvPr>
+          <p:cNvSpPr>
+            <a:spLocks noChangeAspect="1"/>
+          </p:cNvSpPr>
+          <p:nvPr/>
+        </p:nvSpPr>
+        <p:spPr>
+          <a:xfrm>
+            <a:off x="142200" y="249101"/>
+            <a:ext cx="8831579" cy="840455"/>
+          </a:xfrm>
+          <a:prstGeom prst="rect">
+            <a:avLst/>
+          </a:prstGeom>
+          <a:solidFill>
+            <a:schemeClr val="accent1"/>
+          </a:solidFill>
+          <a:ln>
+            <a:noFill/>
+          </a:ln>
+          <a:effectLst/>
+        </p:spPr>
+        <p:style>
+          <a:lnRef idx="1">
+            <a:schemeClr val="accent1"/>
+          </a:lnRef>
+          <a:fillRef idx="3">
+            <a:schemeClr val="accent1"/>
+          </a:fillRef>
+          <a:effectRef idx="2">
+            <a:schemeClr val="accent1"/>
+          </a:effectRef>
+          <a:fontRef idx="minor">
+            <a:schemeClr val="lt1"/>
+          </a:fontRef>
+        </p:style>
+        <p:txBody>
+          <a:bodyPr/>
+          <a:lstStyle/>
+          <a:p>
+            <a:endParaRPr lang="en-US" dirty="0"/>
+          </a:p>
+        </p:txBody>
+      </p:sp>
+      <p:sp>
+        <p:nvSpPr>
+          <p:cNvPr id="16" name="Title 1">
+            <a:extLst>
+              <a:ext uri="{FF2B5EF4-FFF2-40B4-BE49-F238E27FC236}">
+                <a16:creationId xmlns:a16="http://schemas.microsoft.com/office/drawing/2014/main" id="{389BF07E-558D-420A-943A-465BCC22754A}"/>
+              </a:ext>
+            </a:extLst>
+          </p:cNvPr>
+          <p:cNvSpPr>
+            <a:spLocks noGrp="1"/>
+          </p:cNvSpPr>
+          <p:nvPr>
+            <p:ph type="title"/>
+          </p:nvPr>
+        </p:nvSpPr>
+        <p:spPr>
+          <a:xfrm>
+            <a:off x="175260" y="292975"/>
+            <a:ext cx="8746864" cy="752706"/>
+          </a:xfrm>
+        </p:spPr>
+        <p:txBody>
+          <a:bodyPr anchor="t"/>
+          <a:lstStyle>
+            <a:lvl1pPr>
+              <a:defRPr>
+                <a:solidFill>
+                  <a:schemeClr val="tx1"/>
+                </a:solidFill>
+              </a:defRPr>
+            </a:lvl1pPr>
+          </a:lstStyle>
+          <a:p>
+            <a:r>
+              <a:rPr lang="en-US"/>
+              <a:t>Click to edit Master title style</a:t>
+            </a:r>
+            <a:endParaRPr lang="en-US" dirty="0"/>
+          </a:p>
+        </p:txBody>
+      </p:sp>
+      <p:cxnSp>
+        <p:nvCxnSpPr>
+          <p:cNvPr id="12" name="Straight Connector 11">
+            <a:extLst>
+              <a:ext uri="{FF2B5EF4-FFF2-40B4-BE49-F238E27FC236}">
+                <a16:creationId xmlns:a16="http://schemas.microsoft.com/office/drawing/2014/main" id="{C48CB7D8-EE5D-E546-BE85-727F7632C22D}"/>
+              </a:ext>
+            </a:extLst>
+          </p:cNvPr>
+          <p:cNvCxnSpPr/>
+          <p:nvPr userDrawn="1"/>
+        </p:nvCxnSpPr>
+        <p:spPr>
+          <a:xfrm>
+            <a:off x="175260" y="6316935"/>
+            <a:ext cx="8831580" cy="0"/>
+          </a:xfrm>
+          <a:prstGeom prst="line">
+            <a:avLst/>
+          </a:prstGeom>
+        </p:spPr>
+        <p:style>
+          <a:lnRef idx="1">
+            <a:schemeClr val="dk1"/>
+          </a:lnRef>
+          <a:fillRef idx="0">
+            <a:schemeClr val="dk1"/>
+          </a:fillRef>
+          <a:effectRef idx="0">
+            <a:schemeClr val="dk1"/>
+          </a:effectRef>
+          <a:fontRef idx="minor">
+            <a:schemeClr val="tx1"/>
+          </a:fontRef>
+        </p:style>
+      </p:cxnSp>
+      <p:sp>
+        <p:nvSpPr>
+          <p:cNvPr id="13" name="Rectangle 12">
+            <a:extLst>
+              <a:ext uri="{FF2B5EF4-FFF2-40B4-BE49-F238E27FC236}">
+                <a16:creationId xmlns:a16="http://schemas.microsoft.com/office/drawing/2014/main" id="{C6A2F7E1-A865-0A40-B7EA-432D3B7C6BEE}"/>
+              </a:ext>
+            </a:extLst>
+          </p:cNvPr>
+          <p:cNvSpPr>
+            <a:spLocks noChangeAspect="1"/>
+          </p:cNvSpPr>
+          <p:nvPr userDrawn="1"/>
+        </p:nvSpPr>
+        <p:spPr>
+          <a:xfrm>
+            <a:off x="142200" y="249101"/>
+            <a:ext cx="8831579" cy="840455"/>
+          </a:xfrm>
+          <a:prstGeom prst="rect">
+            <a:avLst/>
+          </a:prstGeom>
+          <a:solidFill>
+            <a:schemeClr val="accent1"/>
+          </a:solidFill>
+          <a:ln>
+            <a:noFill/>
+          </a:ln>
+          <a:effectLst/>
+        </p:spPr>
+        <p:style>
+          <a:lnRef idx="1">
+            <a:schemeClr val="accent1"/>
+          </a:lnRef>
+          <a:fillRef idx="3">
+            <a:schemeClr val="accent1"/>
+          </a:fillRef>
+          <a:effectRef idx="2">
+            <a:schemeClr val="accent1"/>
+          </a:effectRef>
+          <a:fontRef idx="minor">
+            <a:schemeClr val="lt1"/>
+          </a:fontRef>
+        </p:style>
+        <p:txBody>
+          <a:bodyPr/>
+          <a:lstStyle/>
+          <a:p>
+            <a:endParaRPr lang="en-US" dirty="0"/>
+          </a:p>
+        </p:txBody>
+      </p:sp>
+    </p:spTree>
+    <p:extLst>
+      <p:ext uri="{BB962C8B-B14F-4D97-AF65-F5344CB8AC3E}">
+        <p14:creationId xmlns:p14="http://schemas.microsoft.com/office/powerpoint/2010/main" val="2757962897"/>
+      </p:ext>
+    </p:extLst>
+  </p:cSld>
+  <p:clrMapOvr>
+    <a:masterClrMapping/>
+  </p:clrMapOvr>
+</p:sldLayout>
+</file>
+
+<file path=ppt/slideLayouts/slideLayout5.xml><?xml version="1.0" encoding="utf-8"?>
+<p:sldLayout xmlns:a="http://schemas.openxmlformats.org/drawingml/2006/main" xmlns:r="http://schemas.openxmlformats.org/officeDocument/2006/relationships" xmlns:p="http://schemas.openxmlformats.org/presentationml/2006/main" preserve="1">
+  <p:cSld name="Comparison">
+    <p:spTree>
+      <p:nvGrpSpPr>
+        <p:cNvPr id="1" name=""/>
+        <p:cNvGrpSpPr/>
+        <p:nvPr/>
+      </p:nvGrpSpPr>
+      <p:grpSpPr>
+        <a:xfrm>
+          <a:off x="0" y="0"/>
+          <a:ext cx="0" cy="0"/>
+          <a:chOff x="0" y="0"/>
+          <a:chExt cx="0" cy="0"/>
+        </a:xfrm>
+      </p:grpSpPr>
+      <p:sp>
+        <p:nvSpPr>
+          <p:cNvPr id="3" name="Text Placeholder 2"/>
+          <p:cNvSpPr>
+            <a:spLocks noGrp="1"/>
+          </p:cNvSpPr>
+          <p:nvPr>
+            <p:ph type="body" idx="1"/>
+          </p:nvPr>
+        </p:nvSpPr>
+        <p:spPr>
+          <a:xfrm>
+            <a:off x="887219" y="2228003"/>
+            <a:ext cx="3593500" cy="576262"/>
+          </a:xfrm>
+        </p:spPr>
+        <p:txBody>
+          <a:bodyPr anchor="b">
+            <a:noAutofit/>
+          </a:bodyPr>
+          <a:lstStyle>
+            <a:lvl1pPr marL="0" indent="0">
+              <a:buNone/>
+              <a:defRPr sz="2200" b="0">
+                <a:solidFill>
+                  <a:schemeClr val="accent2"/>
+                </a:solidFill>
+              </a:defRPr>
+            </a:lvl1pPr>
+            <a:lvl2pPr marL="457200" indent="0">
+              <a:buNone/>
+              <a:defRPr sz="2000" b="1"/>
+            </a:lvl2pPr>
+            <a:lvl3pPr marL="914400" indent="0">
+              <a:buNone/>
+              <a:defRPr sz="1800" b="1"/>
+            </a:lvl3pPr>
+            <a:lvl4pPr marL="1371600" indent="0">
+              <a:buNone/>
+              <a:defRPr sz="1600" b="1"/>
+            </a:lvl4pPr>
+            <a:lvl5pPr marL="1828800" indent="0">
+              <a:buNone/>
+              <a:defRPr sz="1600" b="1"/>
+            </a:lvl5pPr>
+            <a:lvl6pPr marL="2286000" indent="0">
+              <a:buNone/>
+              <a:defRPr sz="1600" b="1"/>
+            </a:lvl6pPr>
+            <a:lvl7pPr marL="2743200" indent="0">
+              <a:buNone/>
+              <a:defRPr sz="1600" b="1"/>
+            </a:lvl7pPr>
+            <a:lvl8pPr marL="3200400" indent="0">
+              <a:buNone/>
+              <a:defRPr sz="1600" b="1"/>
+            </a:lvl8pPr>
+            <a:lvl9pPr marL="3657600" indent="0">
+              <a:buNone/>
+              <a:defRPr sz="1600" b="1"/>
+            </a:lvl9pPr>
+          </a:lstStyle>
+          <a:p>
+            <a:pPr lvl="0"/>
+            <a:r>
+              <a:rPr lang="en-US"/>
+              <a:t>Click to edit Master text styles</a:t>
+            </a:r>
+          </a:p>
+        </p:txBody>
+      </p:sp>
+      <p:sp>
+        <p:nvSpPr>
+          <p:cNvPr id="4" name="Content Placeholder 3"/>
+          <p:cNvSpPr>
+            <a:spLocks noGrp="1"/>
+          </p:cNvSpPr>
+          <p:nvPr>
+            <p:ph sz="half" idx="2"/>
+          </p:nvPr>
+        </p:nvSpPr>
+        <p:spPr>
+          <a:xfrm>
+            <a:off x="581192" y="2926051"/>
+            <a:ext cx="3899527" cy="2934999"/>
+          </a:xfrm>
+        </p:spPr>
+        <p:txBody>
+          <a:bodyPr anchor="t">
+            <a:normAutofit/>
+          </a:bodyPr>
+          <a:lstStyle/>
+          <a:p>
+            <a:pPr lvl="0"/>
+            <a:r>
+              <a:rPr lang="en-US"/>
+              <a:t>Click to edit Master text styles</a:t>
+            </a:r>
+          </a:p>
+          <a:p>
+            <a:pPr lvl="1"/>
+            <a:r>
+              <a:rPr lang="en-US"/>
+              <a:t>Second level</a:t>
+            </a:r>
+          </a:p>
+          <a:p>
+            <a:pPr lvl="2"/>
+            <a:r>
+              <a:rPr lang="en-US"/>
+              <a:t>Third level</a:t>
+            </a:r>
+          </a:p>
+          <a:p>
+            <a:pPr lvl="3"/>
+            <a:r>
+              <a:rPr lang="en-US"/>
+              <a:t>Fourth level</a:t>
+            </a:r>
+          </a:p>
+          <a:p>
+            <a:pPr lvl="4"/>
+            <a:r>
+              <a:rPr lang="en-US"/>
+              <a:t>Fifth level</a:t>
+            </a:r>
+            <a:endParaRPr lang="en-US" dirty="0"/>
+          </a:p>
+        </p:txBody>
+      </p:sp>
+      <p:sp>
+        <p:nvSpPr>
+          <p:cNvPr id="5" name="Text Placeholder 4"/>
+          <p:cNvSpPr>
+            <a:spLocks noGrp="1"/>
+          </p:cNvSpPr>
+          <p:nvPr>
+            <p:ph type="body" sz="quarter" idx="3"/>
+          </p:nvPr>
+        </p:nvSpPr>
+        <p:spPr>
+          <a:xfrm>
+            <a:off x="4969308" y="2228003"/>
+            <a:ext cx="3601635" cy="576262"/>
+          </a:xfrm>
+        </p:spPr>
+        <p:txBody>
+          <a:bodyPr anchor="b">
+            <a:noAutofit/>
+          </a:bodyPr>
+          <a:lstStyle>
+            <a:lvl1pPr marL="0" indent="0">
+              <a:buNone/>
+              <a:defRPr sz="2200" b="0">
+                <a:solidFill>
+                  <a:schemeClr val="accent2"/>
+                </a:solidFill>
+              </a:defRPr>
+            </a:lvl1pPr>
+            <a:lvl2pPr marL="457200" indent="0">
+              <a:buNone/>
+              <a:defRPr sz="2000" b="1"/>
+            </a:lvl2pPr>
+            <a:lvl3pPr marL="914400" indent="0">
+              <a:buNone/>
+              <a:defRPr sz="1800" b="1"/>
+            </a:lvl3pPr>
+            <a:lvl4pPr marL="1371600" indent="0">
+              <a:buNone/>
+              <a:defRPr sz="1600" b="1"/>
+            </a:lvl4pPr>
+            <a:lvl5pPr marL="1828800" indent="0">
+              <a:buNone/>
+              <a:defRPr sz="1600" b="1"/>
+            </a:lvl5pPr>
+            <a:lvl6pPr marL="2286000" indent="0">
+              <a:buNone/>
+              <a:defRPr sz="1600" b="1"/>
+            </a:lvl6pPr>
+            <a:lvl7pPr marL="2743200" indent="0">
+              <a:buNone/>
+              <a:defRPr sz="1600" b="1"/>
+            </a:lvl7pPr>
+            <a:lvl8pPr marL="3200400" indent="0">
+              <a:buNone/>
+              <a:defRPr sz="1600" b="1"/>
+            </a:lvl8pPr>
+            <a:lvl9pPr marL="3657600" indent="0">
+              <a:buNone/>
+              <a:defRPr sz="1600" b="1"/>
+            </a:lvl9pPr>
+          </a:lstStyle>
+          <a:p>
+            <a:pPr lvl="0"/>
+            <a:r>
+              <a:rPr lang="en-US"/>
+              <a:t>Click to edit Master text styles</a:t>
+            </a:r>
+          </a:p>
+        </p:txBody>
+      </p:sp>
+      <p:sp>
+        <p:nvSpPr>
+          <p:cNvPr id="6" name="Content Placeholder 5"/>
+          <p:cNvSpPr>
+            <a:spLocks noGrp="1"/>
+          </p:cNvSpPr>
+          <p:nvPr>
+            <p:ph sz="quarter" idx="4"/>
+          </p:nvPr>
+        </p:nvSpPr>
+        <p:spPr>
+          <a:xfrm>
+            <a:off x="4663282" y="2926051"/>
+            <a:ext cx="3907662" cy="2934999"/>
+          </a:xfrm>
+        </p:spPr>
+        <p:txBody>
+          <a:bodyPr anchor="t">
+            <a:normAutofit/>
+          </a:bodyPr>
+          <a:lstStyle/>
+          <a:p>
+            <a:pPr lvl="0"/>
+            <a:r>
+              <a:rPr lang="en-US"/>
+              <a:t>Click to edit Master text styles</a:t>
+            </a:r>
+          </a:p>
+          <a:p>
+            <a:pPr lvl="1"/>
+            <a:r>
+              <a:rPr lang="en-US"/>
+              <a:t>Second level</a:t>
+            </a:r>
+          </a:p>
+          <a:p>
+            <a:pPr lvl="2"/>
+            <a:r>
+              <a:rPr lang="en-US"/>
+              <a:t>Third level</a:t>
+            </a:r>
+          </a:p>
+          <a:p>
+            <a:pPr lvl="3"/>
+            <a:r>
+              <a:rPr lang="en-US"/>
+              <a:t>Fourth level</a:t>
+            </a:r>
+          </a:p>
+          <a:p>
+            <a:pPr lvl="4"/>
+            <a:r>
+              <a:rPr lang="en-US"/>
+              <a:t>Fifth level</a:t>
+            </a:r>
+            <a:endParaRPr lang="en-US" dirty="0"/>
+          </a:p>
+        </p:txBody>
+      </p:sp>
+      <p:sp>
+        <p:nvSpPr>
+          <p:cNvPr id="7" name="Date Placeholder 6"/>
+          <p:cNvSpPr>
+            <a:spLocks noGrp="1"/>
+          </p:cNvSpPr>
+          <p:nvPr>
+            <p:ph type="dt" sz="half" idx="10"/>
+          </p:nvPr>
+        </p:nvSpPr>
+        <p:spPr>
+          <a:xfrm>
+            <a:off x="5559327" y="5956136"/>
+            <a:ext cx="2133600" cy="365125"/>
+          </a:xfrm>
+          <a:prstGeom prst="rect">
+            <a:avLst/>
+          </a:prstGeom>
+        </p:spPr>
+        <p:txBody>
+          <a:bodyPr/>
+          <a:lstStyle/>
+          <a:p>
+            <a:endParaRPr lang="en-US"/>
+          </a:p>
+        </p:txBody>
+      </p:sp>
+      <p:sp>
+        <p:nvSpPr>
+          <p:cNvPr id="8" name="Footer Placeholder 7"/>
+          <p:cNvSpPr>
+            <a:spLocks noGrp="1"/>
+          </p:cNvSpPr>
+          <p:nvPr>
+            <p:ph type="ftr" sz="quarter" idx="11"/>
+          </p:nvPr>
+        </p:nvSpPr>
+        <p:spPr>
+          <a:xfrm>
+            <a:off x="581192" y="5951810"/>
+            <a:ext cx="4870585" cy="365125"/>
+          </a:xfrm>
+          <a:prstGeom prst="rect">
+            <a:avLst/>
+          </a:prstGeom>
+        </p:spPr>
+        <p:txBody>
+          <a:bodyPr/>
+          <a:lstStyle/>
+          <a:p>
+            <a:r>
+              <a:rPr lang="en-GB"/>
+              <a:t>Copyright © 2020 SPIKE Prime Lessons (primelessons.org) CC-BY-NC-SA.  (Last edit: 11/23/2020)</a:t>
+            </a:r>
+            <a:endParaRPr lang="en-US" dirty="0"/>
+          </a:p>
+        </p:txBody>
+      </p:sp>
+      <p:sp>
+        <p:nvSpPr>
+          <p:cNvPr id="9" name="Slide Number Placeholder 8"/>
+          <p:cNvSpPr>
+            <a:spLocks noGrp="1"/>
+          </p:cNvSpPr>
+          <p:nvPr>
+            <p:ph type="sldNum" sz="quarter" idx="12"/>
+          </p:nvPr>
+        </p:nvSpPr>
+        <p:spPr>
+          <a:xfrm>
+            <a:off x="7800476" y="5956136"/>
+            <a:ext cx="770468" cy="365125"/>
+          </a:xfrm>
+          <a:prstGeom prst="rect">
+            <a:avLst/>
+          </a:prstGeom>
+        </p:spPr>
+        <p:txBody>
+          <a:bodyPr/>
+          <a:lstStyle/>
+          <a:p>
+            <a:fld id="{BBD74847-7BE4-4E4D-8159-51DF7B93C616}" type="slidenum">
+              <a:rPr lang="en-US" smtClean="0"/>
+              <a:t>‹#›</a:t>
+            </a:fld>
+            <a:endParaRPr lang="en-US"/>
+          </a:p>
+        </p:txBody>
+      </p:sp>
+      <p:sp>
+        <p:nvSpPr>
+          <p:cNvPr id="14" name="Rectangle 13">
+            <a:extLst>
+              <a:ext uri="{FF2B5EF4-FFF2-40B4-BE49-F238E27FC236}">
+                <a16:creationId xmlns:a16="http://schemas.microsoft.com/office/drawing/2014/main" id="{4E7E6853-34E8-4052-808F-422B5860D591}"/>
+              </a:ext>
+            </a:extLst>
+          </p:cNvPr>
+          <p:cNvSpPr>
+            <a:spLocks noChangeAspect="1"/>
+          </p:cNvSpPr>
+          <p:nvPr/>
+        </p:nvSpPr>
+        <p:spPr>
+          <a:xfrm>
+            <a:off x="142200" y="249101"/>
+            <a:ext cx="8831579" cy="840455"/>
+          </a:xfrm>
+          <a:prstGeom prst="rect">
+            <a:avLst/>
+          </a:prstGeom>
+          <a:solidFill>
+            <a:schemeClr val="accent1"/>
+          </a:solidFill>
+          <a:ln>
+            <a:noFill/>
+          </a:ln>
+          <a:effectLst/>
+        </p:spPr>
+        <p:style>
+          <a:lnRef idx="1">
+            <a:schemeClr val="accent1"/>
+          </a:lnRef>
+          <a:fillRef idx="3">
+            <a:schemeClr val="accent1"/>
+          </a:fillRef>
+          <a:effectRef idx="2">
+            <a:schemeClr val="accent1"/>
+          </a:effectRef>
+          <a:fontRef idx="minor">
+            <a:schemeClr val="lt1"/>
+          </a:fontRef>
+        </p:style>
+        <p:txBody>
+          <a:bodyPr/>
+          <a:lstStyle/>
+          <a:p>
+            <a:endParaRPr lang="en-US" dirty="0"/>
+          </a:p>
+        </p:txBody>
+      </p:sp>
+      <p:sp>
+        <p:nvSpPr>
+          <p:cNvPr id="15" name="Title 1">
+            <a:extLst>
+              <a:ext uri="{FF2B5EF4-FFF2-40B4-BE49-F238E27FC236}">
+                <a16:creationId xmlns:a16="http://schemas.microsoft.com/office/drawing/2014/main" id="{0EFA1566-CE68-450F-950A-CED460092EA8}"/>
+              </a:ext>
+            </a:extLst>
+          </p:cNvPr>
+          <p:cNvSpPr>
+            <a:spLocks noGrp="1"/>
+          </p:cNvSpPr>
+          <p:nvPr>
+            <p:ph type="title"/>
+          </p:nvPr>
+        </p:nvSpPr>
+        <p:spPr>
+          <a:xfrm>
+            <a:off x="175260" y="292975"/>
+            <a:ext cx="8746864" cy="752706"/>
+          </a:xfrm>
+        </p:spPr>
+        <p:txBody>
+          <a:bodyPr anchor="t"/>
+          <a:lstStyle>
+            <a:lvl1pPr>
+              <a:defRPr>
+                <a:solidFill>
+                  <a:schemeClr val="tx1"/>
+                </a:solidFill>
+              </a:defRPr>
+            </a:lvl1pPr>
+          </a:lstStyle>
+          <a:p>
+            <a:r>
+              <a:rPr lang="en-US"/>
+              <a:t>Click to edit Master title style</a:t>
+            </a:r>
+            <a:endParaRPr lang="en-US" dirty="0"/>
+          </a:p>
+        </p:txBody>
+      </p:sp>
+      <p:sp>
+        <p:nvSpPr>
+          <p:cNvPr id="11" name="Rectangle 10">
+            <a:extLst>
+              <a:ext uri="{FF2B5EF4-FFF2-40B4-BE49-F238E27FC236}">
+                <a16:creationId xmlns:a16="http://schemas.microsoft.com/office/drawing/2014/main" id="{6F6FB0E4-E8AB-2849-A4AF-7363916D8FBA}"/>
+              </a:ext>
+            </a:extLst>
+          </p:cNvPr>
+          <p:cNvSpPr>
+            <a:spLocks noChangeAspect="1"/>
+          </p:cNvSpPr>
+          <p:nvPr userDrawn="1"/>
+        </p:nvSpPr>
+        <p:spPr>
+          <a:xfrm>
+            <a:off x="142200" y="249101"/>
+            <a:ext cx="8831579" cy="840455"/>
+          </a:xfrm>
+          <a:prstGeom prst="rect">
+            <a:avLst/>
+          </a:prstGeom>
+          <a:solidFill>
+            <a:schemeClr val="accent1"/>
+          </a:solidFill>
+          <a:ln>
+            <a:noFill/>
+          </a:ln>
+          <a:effectLst/>
+        </p:spPr>
+        <p:style>
+          <a:lnRef idx="1">
+            <a:schemeClr val="accent1"/>
+          </a:lnRef>
+          <a:fillRef idx="3">
+            <a:schemeClr val="accent1"/>
+          </a:fillRef>
+          <a:effectRef idx="2">
+            <a:schemeClr val="accent1"/>
+          </a:effectRef>
+          <a:fontRef idx="minor">
+            <a:schemeClr val="lt1"/>
+          </a:fontRef>
+        </p:style>
+        <p:txBody>
+          <a:bodyPr/>
+          <a:lstStyle/>
+          <a:p>
+            <a:endParaRPr lang="en-US" dirty="0"/>
+          </a:p>
+        </p:txBody>
+      </p:sp>
+    </p:spTree>
+    <p:extLst>
+      <p:ext uri="{BB962C8B-B14F-4D97-AF65-F5344CB8AC3E}">
+        <p14:creationId xmlns:p14="http://schemas.microsoft.com/office/powerpoint/2010/main" val="521950048"/>
+      </p:ext>
+    </p:extLst>
+  </p:cSld>
+  <p:clrMapOvr>
+    <a:masterClrMapping/>
+  </p:clrMapOvr>
+</p:sldLayout>
+</file>
+
 <file path=ppt/slideLayouts/slideLayout6.xml><?xml version="1.0" encoding="utf-8"?>
-<p:sldLayout xmlns:a="http://schemas.openxmlformats.org/drawingml/2006/main" xmlns:r="http://schemas.openxmlformats.org/officeDocument/2006/relationships" xmlns:p="http://schemas.openxmlformats.org/presentationml/2006/main" preserve="1" userDrawn="1">
+<p:sldLayout xmlns:a="http://schemas.openxmlformats.org/drawingml/2006/main" xmlns:r="http://schemas.openxmlformats.org/officeDocument/2006/relationships" xmlns:p="http://schemas.openxmlformats.org/presentationml/2006/main" preserve="1">
   <p:cSld name="Title Only">
     <p:spTree>
       <p:nvGrpSpPr>
@@ -3623,7 +5371,7 @@
             </a:extLst>
           </p:cNvPr>
           <p:cNvCxnSpPr/>
-          <p:nvPr userDrawn="1"/>
+          <p:nvPr/>
         </p:nvCxnSpPr>
         <p:spPr>
           <a:xfrm>
@@ -3661,7 +5409,7 @@
           <p:cNvSpPr>
             <a:spLocks noChangeAspect="1"/>
           </p:cNvSpPr>
-          <p:nvPr userDrawn="1"/>
+          <p:nvPr/>
         </p:nvSpPr>
         <p:spPr>
           <a:xfrm>
@@ -3736,16 +5484,105 @@
           </a:lstStyle>
           <a:p>
             <a:r>
-              <a:rPr lang="en-US" dirty="0"/>
+              <a:rPr lang="en-US"/>
               <a:t>Click to edit Master title style</a:t>
             </a:r>
+            <a:endParaRPr lang="en-US" dirty="0"/>
+          </a:p>
+        </p:txBody>
+      </p:sp>
+      <p:cxnSp>
+        <p:nvCxnSpPr>
+          <p:cNvPr id="10" name="Straight Connector 9">
+            <a:extLst>
+              <a:ext uri="{FF2B5EF4-FFF2-40B4-BE49-F238E27FC236}">
+                <a16:creationId xmlns:a16="http://schemas.microsoft.com/office/drawing/2014/main" id="{D41DCC12-2626-E94C-ACF9-165EE520BC4B}"/>
+              </a:ext>
+            </a:extLst>
+          </p:cNvPr>
+          <p:cNvCxnSpPr/>
+          <p:nvPr userDrawn="1"/>
+        </p:nvCxnSpPr>
+        <p:spPr>
+          <a:xfrm>
+            <a:off x="175260" y="6316935"/>
+            <a:ext cx="8831580" cy="0"/>
+          </a:xfrm>
+          <a:prstGeom prst="line">
+            <a:avLst/>
+          </a:prstGeom>
+        </p:spPr>
+        <p:style>
+          <a:lnRef idx="1">
+            <a:schemeClr val="dk1"/>
+          </a:lnRef>
+          <a:fillRef idx="0">
+            <a:schemeClr val="dk1"/>
+          </a:fillRef>
+          <a:effectRef idx="0">
+            <a:schemeClr val="dk1"/>
+          </a:effectRef>
+          <a:fontRef idx="minor">
+            <a:schemeClr val="tx1"/>
+          </a:fontRef>
+        </p:style>
+      </p:cxnSp>
+      <p:sp>
+        <p:nvSpPr>
+          <p:cNvPr id="11" name="Rectangle 10">
+            <a:extLst>
+              <a:ext uri="{FF2B5EF4-FFF2-40B4-BE49-F238E27FC236}">
+                <a16:creationId xmlns:a16="http://schemas.microsoft.com/office/drawing/2014/main" id="{6EFC6424-EDB7-5848-937A-B4E52ABA8CC8}"/>
+              </a:ext>
+            </a:extLst>
+          </p:cNvPr>
+          <p:cNvSpPr>
+            <a:spLocks noChangeAspect="1"/>
+          </p:cNvSpPr>
+          <p:nvPr userDrawn="1"/>
+        </p:nvSpPr>
+        <p:spPr>
+          <a:xfrm>
+            <a:off x="142200" y="249101"/>
+            <a:ext cx="8831579" cy="840455"/>
+          </a:xfrm>
+          <a:prstGeom prst="rect">
+            <a:avLst/>
+          </a:prstGeom>
+          <a:solidFill>
+            <a:schemeClr val="accent1"/>
+          </a:solidFill>
+          <a:ln>
+            <a:noFill/>
+          </a:ln>
+          <a:effectLst/>
+        </p:spPr>
+        <p:style>
+          <a:lnRef idx="1">
+            <a:schemeClr val="accent1"/>
+          </a:lnRef>
+          <a:fillRef idx="3">
+            <a:schemeClr val="accent1"/>
+          </a:fillRef>
+          <a:effectRef idx="2">
+            <a:schemeClr val="accent1"/>
+          </a:effectRef>
+          <a:fontRef idx="minor">
+            <a:schemeClr val="lt1"/>
+          </a:fontRef>
+        </p:style>
+        <p:txBody>
+          <a:bodyPr/>
+          <a:lstStyle/>
+          <a:p>
+            <a:endParaRPr lang="en-US" dirty="0"/>
           </a:p>
         </p:txBody>
       </p:sp>
     </p:spTree>
     <p:extLst>
       <p:ext uri="{BB962C8B-B14F-4D97-AF65-F5344CB8AC3E}">
-        <p14:creationId xmlns:p14="http://schemas.microsoft.com/office/powerpoint/2010/main" val="997795342"/>
+        <p14:creationId xmlns:p14="http://schemas.microsoft.com/office/powerpoint/2010/main" val="2325449900"/>
       </p:ext>
     </p:extLst>
   </p:cSld>
@@ -3756,7 +5593,7 @@
 </file>
 
 <file path=ppt/slideLayouts/slideLayout7.xml><?xml version="1.0" encoding="utf-8"?>
-<p:sldLayout xmlns:a="http://schemas.openxmlformats.org/drawingml/2006/main" xmlns:r="http://schemas.openxmlformats.org/officeDocument/2006/relationships" xmlns:p="http://schemas.openxmlformats.org/presentationml/2006/main" preserve="1" userDrawn="1">
+<p:sldLayout xmlns:a="http://schemas.openxmlformats.org/drawingml/2006/main" xmlns:r="http://schemas.openxmlformats.org/officeDocument/2006/relationships" xmlns:p="http://schemas.openxmlformats.org/presentationml/2006/main" preserve="1">
   <p:cSld name="Blank">
     <p:spTree>
       <p:nvGrpSpPr>
@@ -3784,7 +5621,7 @@
           <p:cNvSpPr>
             <a:spLocks noChangeAspect="1"/>
           </p:cNvSpPr>
-          <p:nvPr userDrawn="1"/>
+          <p:nvPr/>
         </p:nvSpPr>
         <p:spPr>
           <a:xfrm>
@@ -3859,9 +5696,10 @@
           </a:lstStyle>
           <a:p>
             <a:r>
-              <a:rPr lang="en-US" dirty="0"/>
+              <a:rPr lang="en-US"/>
               <a:t>Click to edit Master title style</a:t>
             </a:r>
+            <a:endParaRPr lang="en-US" dirty="0"/>
           </a:p>
         </p:txBody>
       </p:sp>
@@ -3912,7 +5750,7 @@
             </a:extLst>
           </p:cNvPr>
           <p:cNvCxnSpPr/>
-          <p:nvPr userDrawn="1"/>
+          <p:nvPr/>
         </p:nvCxnSpPr>
         <p:spPr>
           <a:xfrm>
@@ -3975,10 +5813,98 @@
           </a:p>
         </p:txBody>
       </p:sp>
+      <p:sp>
+        <p:nvSpPr>
+          <p:cNvPr id="7" name="Rectangle 6">
+            <a:extLst>
+              <a:ext uri="{FF2B5EF4-FFF2-40B4-BE49-F238E27FC236}">
+                <a16:creationId xmlns:a16="http://schemas.microsoft.com/office/drawing/2014/main" id="{CBEB7FB9-B791-744A-9ADB-4E0AF034C79F}"/>
+              </a:ext>
+            </a:extLst>
+          </p:cNvPr>
+          <p:cNvSpPr>
+            <a:spLocks noChangeAspect="1"/>
+          </p:cNvSpPr>
+          <p:nvPr userDrawn="1"/>
+        </p:nvSpPr>
+        <p:spPr>
+          <a:xfrm>
+            <a:off x="142200" y="249101"/>
+            <a:ext cx="8831579" cy="840455"/>
+          </a:xfrm>
+          <a:prstGeom prst="rect">
+            <a:avLst/>
+          </a:prstGeom>
+          <a:solidFill>
+            <a:schemeClr val="accent1"/>
+          </a:solidFill>
+          <a:ln>
+            <a:noFill/>
+          </a:ln>
+          <a:effectLst/>
+        </p:spPr>
+        <p:style>
+          <a:lnRef idx="1">
+            <a:schemeClr val="accent1"/>
+          </a:lnRef>
+          <a:fillRef idx="3">
+            <a:schemeClr val="accent1"/>
+          </a:fillRef>
+          <a:effectRef idx="2">
+            <a:schemeClr val="accent1"/>
+          </a:effectRef>
+          <a:fontRef idx="minor">
+            <a:schemeClr val="lt1"/>
+          </a:fontRef>
+        </p:style>
+        <p:txBody>
+          <a:bodyPr/>
+          <a:lstStyle/>
+          <a:p>
+            <a:endParaRPr lang="en-US" dirty="0"/>
+          </a:p>
+        </p:txBody>
+      </p:sp>
+      <p:cxnSp>
+        <p:nvCxnSpPr>
+          <p:cNvPr id="13" name="Straight Connector 12">
+            <a:extLst>
+              <a:ext uri="{FF2B5EF4-FFF2-40B4-BE49-F238E27FC236}">
+                <a16:creationId xmlns:a16="http://schemas.microsoft.com/office/drawing/2014/main" id="{4081940F-F639-F349-89EA-52791D5310A9}"/>
+              </a:ext>
+            </a:extLst>
+          </p:cNvPr>
+          <p:cNvCxnSpPr/>
+          <p:nvPr userDrawn="1"/>
+        </p:nvCxnSpPr>
+        <p:spPr>
+          <a:xfrm>
+            <a:off x="175260" y="6316935"/>
+            <a:ext cx="8831580" cy="0"/>
+          </a:xfrm>
+          <a:prstGeom prst="line">
+            <a:avLst/>
+          </a:prstGeom>
+        </p:spPr>
+        <p:style>
+          <a:lnRef idx="1">
+            <a:schemeClr val="dk1"/>
+          </a:lnRef>
+          <a:fillRef idx="0">
+            <a:schemeClr val="dk1"/>
+          </a:fillRef>
+          <a:effectRef idx="0">
+            <a:schemeClr val="dk1"/>
+          </a:effectRef>
+          <a:fontRef idx="minor">
+            <a:schemeClr val="tx1"/>
+          </a:fontRef>
+        </p:style>
+      </p:cxnSp>
     </p:spTree>
     <p:extLst>
       <p:ext uri="{BB962C8B-B14F-4D97-AF65-F5344CB8AC3E}">
-        <p14:creationId xmlns:p14="http://schemas.microsoft.com/office/powerpoint/2010/main" val="2961518194"/>
+        <p14:creationId xmlns:p14="http://schemas.microsoft.com/office/powerpoint/2010/main" val="3272071937"/>
       </p:ext>
     </p:extLst>
   </p:cSld>
@@ -4402,7 +6328,7 @@
     </p:spTree>
     <p:extLst>
       <p:ext uri="{BB962C8B-B14F-4D97-AF65-F5344CB8AC3E}">
-        <p14:creationId xmlns:p14="http://schemas.microsoft.com/office/powerpoint/2010/main" val="4019911693"/>
+        <p14:creationId xmlns:p14="http://schemas.microsoft.com/office/powerpoint/2010/main" val="3149178610"/>
       </p:ext>
     </p:extLst>
   </p:cSld>
@@ -4693,7 +6619,7 @@
     </p:spTree>
     <p:extLst>
       <p:ext uri="{BB962C8B-B14F-4D97-AF65-F5344CB8AC3E}">
-        <p14:creationId xmlns:p14="http://schemas.microsoft.com/office/powerpoint/2010/main" val="2749694223"/>
+        <p14:creationId xmlns:p14="http://schemas.microsoft.com/office/powerpoint/2010/main" val="1973923992"/>
       </p:ext>
     </p:extLst>
   </p:cSld>
@@ -4751,9 +6677,10 @@
           <a:lstStyle/>
           <a:p>
             <a:r>
-              <a:rPr lang="en-US" dirty="0"/>
+              <a:rPr lang="en-US"/>
               <a:t>Click to edit Master title style</a:t>
             </a:r>
+            <a:endParaRPr lang="en-US" dirty="0"/>
           </a:p>
         </p:txBody>
       </p:sp>
@@ -4784,37 +6711,38 @@
           <a:p>
             <a:pPr lvl="0"/>
             <a:r>
-              <a:rPr lang="en-US" dirty="0"/>
+              <a:rPr lang="en-US"/>
               <a:t>Click to edit Master text styles</a:t>
             </a:r>
           </a:p>
           <a:p>
             <a:pPr lvl="1"/>
             <a:r>
-              <a:rPr lang="en-US" dirty="0"/>
+              <a:rPr lang="en-US"/>
               <a:t>Second level</a:t>
             </a:r>
           </a:p>
           <a:p>
             <a:pPr lvl="2"/>
             <a:r>
-              <a:rPr lang="en-US" dirty="0"/>
+              <a:rPr lang="en-US"/>
               <a:t>Third level</a:t>
             </a:r>
           </a:p>
           <a:p>
             <a:pPr lvl="3"/>
             <a:r>
-              <a:rPr lang="en-US" dirty="0"/>
+              <a:rPr lang="en-US"/>
               <a:t>Fourth level</a:t>
             </a:r>
           </a:p>
           <a:p>
             <a:pPr lvl="4"/>
             <a:r>
-              <a:rPr lang="en-US" dirty="0"/>
+              <a:rPr lang="en-US"/>
               <a:t>Fifth level</a:t>
             </a:r>
+            <a:endParaRPr lang="en-US" dirty="0"/>
           </a:p>
         </p:txBody>
       </p:sp>
@@ -4833,7 +6761,7 @@
             <a:avLst/>
           </a:prstGeom>
           <a:solidFill>
-            <a:srgbClr val="65D7FF"/>
+            <a:schemeClr val="tx1"/>
           </a:solidFill>
           <a:ln>
             <a:noFill/>
@@ -4877,7 +6805,7 @@
             <a:avLst/>
           </a:prstGeom>
           <a:solidFill>
-            <a:srgbClr val="FFD500"/>
+            <a:srgbClr val="0EAE9F"/>
           </a:solidFill>
           <a:ln>
             <a:noFill/>
@@ -4914,7 +6842,7 @@
             <a:avLst/>
           </a:prstGeom>
           <a:solidFill>
-            <a:srgbClr val="961BDB"/>
+            <a:srgbClr val="FFD500"/>
           </a:solidFill>
           <a:ln>
             <a:noFill/>
@@ -4955,7 +6883,7 @@
         <p:spPr>
           <a:xfrm>
             <a:off x="88409" y="6266485"/>
-            <a:ext cx="4870585" cy="365125"/>
+            <a:ext cx="7599835" cy="365125"/>
           </a:xfrm>
           <a:prstGeom prst="rect">
             <a:avLst/>
@@ -5025,6 +6953,42 @@
             <a:extLst>
               <a:ext uri="{FF2B5EF4-FFF2-40B4-BE49-F238E27FC236}">
                 <a16:creationId xmlns:a16="http://schemas.microsoft.com/office/drawing/2014/main" id="{6AF90A68-628C-4E8F-BCF5-404070DD47EC}"/>
+              </a:ext>
+            </a:extLst>
+          </p:cNvPr>
+          <p:cNvCxnSpPr/>
+          <p:nvPr/>
+        </p:nvCxnSpPr>
+        <p:spPr>
+          <a:xfrm>
+            <a:off x="175260" y="6316935"/>
+            <a:ext cx="8831580" cy="0"/>
+          </a:xfrm>
+          <a:prstGeom prst="line">
+            <a:avLst/>
+          </a:prstGeom>
+        </p:spPr>
+        <p:style>
+          <a:lnRef idx="1">
+            <a:schemeClr val="dk1"/>
+          </a:lnRef>
+          <a:fillRef idx="0">
+            <a:schemeClr val="dk1"/>
+          </a:fillRef>
+          <a:effectRef idx="0">
+            <a:schemeClr val="dk1"/>
+          </a:effectRef>
+          <a:fontRef idx="minor">
+            <a:schemeClr val="tx1"/>
+          </a:fontRef>
+        </p:style>
+      </p:cxnSp>
+      <p:cxnSp>
+        <p:nvCxnSpPr>
+          <p:cNvPr id="15" name="Straight Connector 14">
+            <a:extLst>
+              <a:ext uri="{FF2B5EF4-FFF2-40B4-BE49-F238E27FC236}">
+                <a16:creationId xmlns:a16="http://schemas.microsoft.com/office/drawing/2014/main" id="{B9CE0AAD-7966-CE4A-A70F-392ACEBDF336}"/>
               </a:ext>
             </a:extLst>
           </p:cNvPr>
@@ -5058,23 +7022,27 @@
     </p:spTree>
     <p:extLst>
       <p:ext uri="{BB962C8B-B14F-4D97-AF65-F5344CB8AC3E}">
-        <p14:creationId xmlns:p14="http://schemas.microsoft.com/office/powerpoint/2010/main" val="3144911534"/>
+        <p14:creationId xmlns:p14="http://schemas.microsoft.com/office/powerpoint/2010/main" val="1758761758"/>
       </p:ext>
     </p:extLst>
   </p:cSld>
   <p:clrMap bg1="lt1" tx1="dk1" bg2="lt2" tx2="dk2" accent1="accent1" accent2="accent2" accent3="accent3" accent4="accent4" accent5="accent5" accent6="accent6" hlink="hlink" folHlink="folHlink"/>
   <p:sldLayoutIdLst>
-    <p:sldLayoutId id="2147483762" r:id="rId1"/>
-    <p:sldLayoutId id="2147483763" r:id="rId2"/>
-    <p:sldLayoutId id="2147483764" r:id="rId3"/>
-    <p:sldLayoutId id="2147483765" r:id="rId4"/>
-    <p:sldLayoutId id="2147483766" r:id="rId5"/>
-    <p:sldLayoutId id="2147483767" r:id="rId6"/>
-    <p:sldLayoutId id="2147483768" r:id="rId7"/>
-    <p:sldLayoutId id="2147483769" r:id="rId8"/>
-    <p:sldLayoutId id="2147483770" r:id="rId9"/>
-    <p:sldLayoutId id="2147483771" r:id="rId10"/>
-    <p:sldLayoutId id="2147483772" r:id="rId11"/>
+    <p:sldLayoutId id="2147483774" r:id="rId1"/>
+    <p:sldLayoutId id="2147483775" r:id="rId2"/>
+    <p:sldLayoutId id="2147483776" r:id="rId3"/>
+    <p:sldLayoutId id="2147483777" r:id="rId4"/>
+    <p:sldLayoutId id="2147483778" r:id="rId5"/>
+    <p:sldLayoutId id="2147483779" r:id="rId6"/>
+    <p:sldLayoutId id="2147483780" r:id="rId7"/>
+    <p:sldLayoutId id="2147483781" r:id="rId8"/>
+    <p:sldLayoutId id="2147483782" r:id="rId9"/>
+    <p:sldLayoutId id="2147483783" r:id="rId10"/>
+    <p:sldLayoutId id="2147483784" r:id="rId11"/>
+    <p:sldLayoutId id="2147483765" r:id="rId12"/>
+    <p:sldLayoutId id="2147483766" r:id="rId13"/>
+    <p:sldLayoutId id="2147483767" r:id="rId14"/>
+    <p:sldLayoutId id="2147483768" r:id="rId15"/>
   </p:sldLayoutIdLst>
   <p:hf hdr="0" dt="0"/>
   <p:txStyles>
@@ -8138,6 +10106,35 @@
       </p:sp>
       <p:sp>
         <p:nvSpPr>
+          <p:cNvPr id="7" name="Slide Number Placeholder 6">
+            <a:extLst>
+              <a:ext uri="{FF2B5EF4-FFF2-40B4-BE49-F238E27FC236}">
+                <a16:creationId xmlns:a16="http://schemas.microsoft.com/office/drawing/2014/main" id="{F6739919-47A8-43E0-85A2-F648492C26DE}"/>
+              </a:ext>
+            </a:extLst>
+          </p:cNvPr>
+          <p:cNvSpPr>
+            <a:spLocks noGrp="1"/>
+          </p:cNvSpPr>
+          <p:nvPr>
+            <p:ph type="sldNum" sz="quarter" idx="12"/>
+          </p:nvPr>
+        </p:nvSpPr>
+        <p:spPr/>
+        <p:txBody>
+          <a:bodyPr/>
+          <a:lstStyle/>
+          <a:p>
+            <a:fld id="{BBD74847-7BE4-4E4D-8159-51DF7B93C616}" type="slidenum">
+              <a:rPr lang="en-US" smtClean="0"/>
+              <a:t>7</a:t>
+            </a:fld>
+            <a:endParaRPr lang="en-US"/>
+          </a:p>
+        </p:txBody>
+      </p:sp>
+      <p:sp>
+        <p:nvSpPr>
           <p:cNvPr id="5" name="Rectangle 4"/>
           <p:cNvSpPr>
             <a:spLocks noChangeArrowheads="1"/>
@@ -8161,7 +10158,7 @@
           <a:effectLst/>
           <a:extLst>
             <a:ext uri="{91240B29-F687-4f45-9708-019B960494DF}">
-              <a14:hiddenLine xmlns:a14="http://schemas.microsoft.com/office/drawing/2010/main" xmlns="" w="9525">
+              <a14:hiddenLine xmlns="" xmlns:a14="http://schemas.microsoft.com/office/drawing/2010/main" w="9525">
                 <a:solidFill>
                   <a:schemeClr val="tx1"/>
                 </a:solidFill>
@@ -8171,7 +10168,7 @@
               </a14:hiddenLine>
             </a:ext>
             <a:ext uri="{AF507438-7753-43e0-B8FC-AC1667EBCBE1}">
-              <a14:hiddenEffects xmlns:a14="http://schemas.microsoft.com/office/drawing/2010/main" xmlns="">
+              <a14:hiddenEffects xmlns="" xmlns:a14="http://schemas.microsoft.com/office/drawing/2010/main">
                 <a:effectLst>
                   <a:outerShdw dist="35921" dir="2700000" algn="ctr" rotWithShape="0">
                     <a:schemeClr val="bg2"/>
@@ -8512,7 +10509,7 @@
           <a:noFill/>
           <a:extLst>
             <a:ext uri="{909E8E84-426E-40dd-AFC4-6F175D3DCCD1}">
-              <a14:hiddenFill xmlns:a14="http://schemas.microsoft.com/office/drawing/2010/main" xmlns="">
+              <a14:hiddenFill xmlns="" xmlns:a14="http://schemas.microsoft.com/office/drawing/2010/main">
                 <a:solidFill>
                   <a:srgbClr val="FFFFFF"/>
                 </a:solidFill>
@@ -8521,35 +10518,6 @@
           </a:extLst>
         </p:spPr>
       </p:pic>
-      <p:sp>
-        <p:nvSpPr>
-          <p:cNvPr id="7" name="Slide Number Placeholder 6">
-            <a:extLst>
-              <a:ext uri="{FF2B5EF4-FFF2-40B4-BE49-F238E27FC236}">
-                <a16:creationId xmlns:a16="http://schemas.microsoft.com/office/drawing/2014/main" id="{F6739919-47A8-43E0-85A2-F648492C26DE}"/>
-              </a:ext>
-            </a:extLst>
-          </p:cNvPr>
-          <p:cNvSpPr>
-            <a:spLocks noGrp="1"/>
-          </p:cNvSpPr>
-          <p:nvPr>
-            <p:ph type="sldNum" sz="quarter" idx="12"/>
-          </p:nvPr>
-        </p:nvSpPr>
-        <p:spPr/>
-        <p:txBody>
-          <a:bodyPr/>
-          <a:lstStyle/>
-          <a:p>
-            <a:fld id="{BBD74847-7BE4-4E4D-8159-51DF7B93C616}" type="slidenum">
-              <a:rPr lang="en-US" smtClean="0"/>
-              <a:t>7</a:t>
-            </a:fld>
-            <a:endParaRPr lang="en-US"/>
-          </a:p>
-        </p:txBody>
-      </p:sp>
     </p:spTree>
     <p:extLst>
       <p:ext uri="{BB962C8B-B14F-4D97-AF65-F5344CB8AC3E}">
@@ -8566,7 +10534,7 @@
 <file path=ppt/theme/theme1.xml><?xml version="1.0" encoding="utf-8"?>
 <a:theme xmlns:a="http://schemas.openxmlformats.org/drawingml/2006/main" name="Dividend">
   <a:themeElements>
-    <a:clrScheme name="Spike Prime Lessons">
+    <a:clrScheme name="Custom 1">
       <a:dk1>
         <a:srgbClr val="000000"/>
       </a:dk1>
@@ -8577,31 +10545,31 @@
         <a:srgbClr val="000000"/>
       </a:dk2>
       <a:lt2>
-        <a:srgbClr val="FFFFFF"/>
+        <a:srgbClr val="F8F8F8"/>
       </a:lt2>
       <a:accent1>
-        <a:srgbClr val="FFD500"/>
+        <a:srgbClr val="DDDDDD"/>
       </a:accent1>
       <a:accent2>
-        <a:srgbClr val="961BDB"/>
+        <a:srgbClr val="B2B2B2"/>
       </a:accent2>
       <a:accent3>
-        <a:srgbClr val="FF0000"/>
+        <a:srgbClr val="969696"/>
       </a:accent3>
       <a:accent4>
-        <a:srgbClr val="65D7FF"/>
+        <a:srgbClr val="000000"/>
       </a:accent4>
       <a:accent5>
-        <a:srgbClr val="5B9BD5"/>
+        <a:srgbClr val="5F5F5F"/>
       </a:accent5>
       <a:accent6>
-        <a:srgbClr val="70AD47"/>
+        <a:srgbClr val="4D4D4D"/>
       </a:accent6>
       <a:hlink>
-        <a:srgbClr val="961BDB"/>
+        <a:srgbClr val="5F5F5F"/>
       </a:hlink>
       <a:folHlink>
-        <a:srgbClr val="65D7FF"/>
+        <a:srgbClr val="919191"/>
       </a:folHlink>
     </a:clrScheme>
     <a:fontScheme name="Dividend">
@@ -8826,7 +10794,7 @@
   <a:extraClrSchemeLst/>
   <a:extLst>
     <a:ext uri="{05A4C25C-085E-4340-85A3-A5531E510DB2}">
-      <thm15:themeFamily xmlns:thm15="http://schemas.microsoft.com/office/thememl/2012/main" name="Spike Prime Template.potx" id="{C1D969FE-89B1-4BE4-BDFA-C32471023150}" vid="{4149DA99-3325-4DAE-8A1C-4D0296C099A1}"/>
+      <thm15:themeFamily xmlns:thm15="http://schemas.microsoft.com/office/thememl/2012/main" name="HowtoUse" id="{7DD8E111-BC3A-4444-A06C-BD4DCB2344B2}" vid="{5D8D2880-D206-C442-A283-BCAB763DE85D}"/>
     </a:ext>
   </a:extLst>
 </a:theme>

</xml_diff>